<commit_message>
Update The Adaptive Radix Tree.pptx
</commit_message>
<xml_diff>
--- a/Presentation/The Adaptive Radix Tree.pptx
+++ b/Presentation/The Adaptive Radix Tree.pptx
@@ -23,7 +23,7 @@
     <p:sldId id="405" r:id="rId11"/>
     <p:sldId id="408" r:id="rId12"/>
     <p:sldId id="406" r:id="rId13"/>
-    <p:sldId id="407" r:id="rId14"/>
+    <p:sldId id="409" r:id="rId14"/>
     <p:sldId id="398" r:id="rId15"/>
     <p:sldId id="399" r:id="rId16"/>
     <p:sldId id="400" r:id="rId17"/>
@@ -204,7 +204,7 @@
             <p14:sldId id="405"/>
             <p14:sldId id="408"/>
             <p14:sldId id="406"/>
-            <p14:sldId id="407"/>
+            <p14:sldId id="409"/>
           </p14:sldIdLst>
         </p14:section>
         <p14:section name="Benchmarks" id="{AEDAD588-01D1-4983-A59D-E10D659187E4}">
@@ -593,7 +593,7 @@
                 <a:cs typeface="+mn-cs"/>
               </a:defRPr>
             </a:pPr>
-            <a:endParaRPr lang="de-DE"/>
+            <a:endParaRPr lang="en-US"/>
           </a:p>
         </c:txPr>
         <c:crossAx val="50531328"/>
@@ -670,7 +670,7 @@
                 <a:cs typeface="+mn-cs"/>
               </a:defRPr>
             </a:pPr>
-            <a:endParaRPr lang="de-DE"/>
+            <a:endParaRPr lang="en-US"/>
           </a:p>
         </c:txPr>
         <c:crossAx val="50529792"/>
@@ -707,7 +707,7 @@
       <a:pPr>
         <a:defRPr/>
       </a:pPr>
-      <a:endParaRPr lang="de-DE"/>
+      <a:endParaRPr lang="en-US"/>
     </a:p>
   </c:txPr>
   <c:externalData r:id="rId1">
@@ -827,7 +827,7 @@
               <a:cs typeface="+mn-cs"/>
             </a:defRPr>
           </a:pPr>
-          <a:endParaRPr lang="de-DE"/>
+          <a:endParaRPr lang="en-US"/>
         </a:p>
       </c:txPr>
     </c:title>
@@ -1059,7 +1059,7 @@
                 <a:cs typeface="+mn-cs"/>
               </a:defRPr>
             </a:pPr>
-            <a:endParaRPr lang="de-DE"/>
+            <a:endParaRPr lang="en-US"/>
           </a:p>
         </c:txPr>
         <c:crossAx val="50531328"/>
@@ -1149,7 +1149,7 @@
                   <a:cs typeface="+mn-cs"/>
                 </a:defRPr>
               </a:pPr>
-              <a:endParaRPr lang="de-DE"/>
+              <a:endParaRPr lang="en-US"/>
             </a:p>
           </c:txPr>
         </c:title>
@@ -1183,7 +1183,7 @@
                 <a:cs typeface="+mn-cs"/>
               </a:defRPr>
             </a:pPr>
-            <a:endParaRPr lang="de-DE"/>
+            <a:endParaRPr lang="en-US"/>
           </a:p>
         </c:txPr>
         <c:crossAx val="50529792"/>
@@ -1222,7 +1222,7 @@
               <a:cs typeface="+mn-cs"/>
             </a:defRPr>
           </a:pPr>
-          <a:endParaRPr lang="de-DE"/>
+          <a:endParaRPr lang="en-US"/>
         </a:p>
       </c:txPr>
     </c:legend>
@@ -1245,7 +1245,7 @@
       <a:pPr>
         <a:defRPr/>
       </a:pPr>
-      <a:endParaRPr lang="de-DE"/>
+      <a:endParaRPr lang="en-US"/>
     </a:p>
   </c:txPr>
   <c:externalData r:id="rId3">
@@ -1365,7 +1365,7 @@
               <a:cs typeface="+mn-cs"/>
             </a:defRPr>
           </a:pPr>
-          <a:endParaRPr lang="de-DE"/>
+          <a:endParaRPr lang="en-US"/>
         </a:p>
       </c:txPr>
     </c:title>
@@ -1597,7 +1597,7 @@
                 <a:cs typeface="+mn-cs"/>
               </a:defRPr>
             </a:pPr>
-            <a:endParaRPr lang="de-DE"/>
+            <a:endParaRPr lang="en-US"/>
           </a:p>
         </c:txPr>
         <c:crossAx val="50531328"/>
@@ -1687,7 +1687,7 @@
                   <a:cs typeface="+mn-cs"/>
                 </a:defRPr>
               </a:pPr>
-              <a:endParaRPr lang="de-DE"/>
+              <a:endParaRPr lang="en-US"/>
             </a:p>
           </c:txPr>
         </c:title>
@@ -1721,7 +1721,7 @@
                 <a:cs typeface="+mn-cs"/>
               </a:defRPr>
             </a:pPr>
-            <a:endParaRPr lang="de-DE"/>
+            <a:endParaRPr lang="en-US"/>
           </a:p>
         </c:txPr>
         <c:crossAx val="50529792"/>
@@ -1760,7 +1760,7 @@
               <a:cs typeface="+mn-cs"/>
             </a:defRPr>
           </a:pPr>
-          <a:endParaRPr lang="de-DE"/>
+          <a:endParaRPr lang="en-US"/>
         </a:p>
       </c:txPr>
     </c:legend>
@@ -1783,7 +1783,7 @@
       <a:pPr>
         <a:defRPr/>
       </a:pPr>
-      <a:endParaRPr lang="de-DE"/>
+      <a:endParaRPr lang="en-US"/>
     </a:p>
   </c:txPr>
   <c:externalData r:id="rId3">
@@ -1903,7 +1903,7 @@
               <a:cs typeface="+mn-cs"/>
             </a:defRPr>
           </a:pPr>
-          <a:endParaRPr lang="de-DE"/>
+          <a:endParaRPr lang="en-US"/>
         </a:p>
       </c:txPr>
     </c:title>
@@ -2135,7 +2135,7 @@
                 <a:cs typeface="+mn-cs"/>
               </a:defRPr>
             </a:pPr>
-            <a:endParaRPr lang="de-DE"/>
+            <a:endParaRPr lang="en-US"/>
           </a:p>
         </c:txPr>
         <c:crossAx val="50531328"/>
@@ -2225,7 +2225,7 @@
                   <a:cs typeface="+mn-cs"/>
                 </a:defRPr>
               </a:pPr>
-              <a:endParaRPr lang="de-DE"/>
+              <a:endParaRPr lang="en-US"/>
             </a:p>
           </c:txPr>
         </c:title>
@@ -2259,7 +2259,7 @@
                 <a:cs typeface="+mn-cs"/>
               </a:defRPr>
             </a:pPr>
-            <a:endParaRPr lang="de-DE"/>
+            <a:endParaRPr lang="en-US"/>
           </a:p>
         </c:txPr>
         <c:crossAx val="50529792"/>
@@ -2298,7 +2298,7 @@
               <a:cs typeface="+mn-cs"/>
             </a:defRPr>
           </a:pPr>
-          <a:endParaRPr lang="de-DE"/>
+          <a:endParaRPr lang="en-US"/>
         </a:p>
       </c:txPr>
     </c:legend>
@@ -2321,7 +2321,7 @@
       <a:pPr>
         <a:defRPr/>
       </a:pPr>
-      <a:endParaRPr lang="de-DE"/>
+      <a:endParaRPr lang="en-US"/>
     </a:p>
   </c:txPr>
   <c:externalData r:id="rId3">
@@ -2441,7 +2441,7 @@
               <a:cs typeface="+mn-cs"/>
             </a:defRPr>
           </a:pPr>
-          <a:endParaRPr lang="de-DE"/>
+          <a:endParaRPr lang="en-US"/>
         </a:p>
       </c:txPr>
     </c:title>
@@ -2673,7 +2673,7 @@
                 <a:cs typeface="+mn-cs"/>
               </a:defRPr>
             </a:pPr>
-            <a:endParaRPr lang="de-DE"/>
+            <a:endParaRPr lang="en-US"/>
           </a:p>
         </c:txPr>
         <c:crossAx val="50531328"/>
@@ -2763,7 +2763,7 @@
                   <a:cs typeface="+mn-cs"/>
                 </a:defRPr>
               </a:pPr>
-              <a:endParaRPr lang="de-DE"/>
+              <a:endParaRPr lang="en-US"/>
             </a:p>
           </c:txPr>
         </c:title>
@@ -2797,7 +2797,7 @@
                 <a:cs typeface="+mn-cs"/>
               </a:defRPr>
             </a:pPr>
-            <a:endParaRPr lang="de-DE"/>
+            <a:endParaRPr lang="en-US"/>
           </a:p>
         </c:txPr>
         <c:crossAx val="50529792"/>
@@ -2836,7 +2836,7 @@
               <a:cs typeface="+mn-cs"/>
             </a:defRPr>
           </a:pPr>
-          <a:endParaRPr lang="de-DE"/>
+          <a:endParaRPr lang="en-US"/>
         </a:p>
       </c:txPr>
     </c:legend>
@@ -2859,7 +2859,7 @@
       <a:pPr>
         <a:defRPr/>
       </a:pPr>
-      <a:endParaRPr lang="de-DE"/>
+      <a:endParaRPr lang="en-US"/>
     </a:p>
   </c:txPr>
   <c:externalData r:id="rId3">
@@ -3167,7 +3167,7 @@
       <a:pPr>
         <a:defRPr sz="1600"/>
       </a:pPr>
-      <a:endParaRPr lang="de-DE"/>
+      <a:endParaRPr lang="en-US"/>
     </a:p>
   </c:txPr>
   <c:externalData r:id="rId1">
@@ -3464,7 +3464,7 @@
                 <a:cs typeface="+mn-cs"/>
               </a:defRPr>
             </a:pPr>
-            <a:endParaRPr lang="de-DE"/>
+            <a:endParaRPr lang="en-US"/>
           </a:p>
         </c:txPr>
         <c:crossAx val="50531328"/>
@@ -3523,7 +3523,7 @@
                 <a:cs typeface="+mn-cs"/>
               </a:defRPr>
             </a:pPr>
-            <a:endParaRPr lang="de-DE"/>
+            <a:endParaRPr lang="en-US"/>
           </a:p>
         </c:txPr>
         <c:crossAx val="50529792"/>
@@ -3575,7 +3575,7 @@
               <a:cs typeface="+mn-cs"/>
             </a:defRPr>
           </a:pPr>
-          <a:endParaRPr lang="de-DE"/>
+          <a:endParaRPr lang="en-US"/>
         </a:p>
       </c:txPr>
     </c:legend>
@@ -3597,7 +3597,7 @@
       <a:pPr>
         <a:defRPr/>
       </a:pPr>
-      <a:endParaRPr lang="de-DE"/>
+      <a:endParaRPr lang="en-US"/>
     </a:p>
   </c:txPr>
   <c:externalData r:id="rId1">
@@ -6330,294 +6330,6 @@
             </a:r>
             <a:r>
               <a:rPr lang="de-DE" dirty="0" err="1"/>
-              <a:t>insert</a:t>
-            </a:r>
-            <a:r>
-              <a:rPr lang="de-DE" dirty="0"/>
-              <a:t>):</a:t>
-            </a:r>
-          </a:p>
-          <a:p>
-            <a:r>
-              <a:rPr lang="de-DE" dirty="0"/>
-              <a:t>(Remove </a:t>
-            </a:r>
-            <a:r>
-              <a:rPr lang="de-DE" dirty="0" err="1"/>
-              <a:t>Sorted</a:t>
-            </a:r>
-            <a:r>
-              <a:rPr lang="de-DE" dirty="0"/>
-              <a:t> List </a:t>
-            </a:r>
-            <a:r>
-              <a:rPr lang="de-DE" dirty="0" err="1"/>
-              <a:t>as</a:t>
-            </a:r>
-            <a:r>
-              <a:rPr lang="de-DE" dirty="0"/>
-              <a:t> </a:t>
-            </a:r>
-            <a:r>
-              <a:rPr lang="de-DE" dirty="0" err="1"/>
-              <a:t>it‘s</a:t>
-            </a:r>
-            <a:r>
-              <a:rPr lang="de-DE" dirty="0"/>
-              <a:t> </a:t>
-            </a:r>
-            <a:r>
-              <a:rPr lang="de-DE" dirty="0" err="1"/>
-              <a:t>only</a:t>
-            </a:r>
-            <a:r>
-              <a:rPr lang="de-DE" dirty="0"/>
-              <a:t> </a:t>
-            </a:r>
-            <a:r>
-              <a:rPr lang="de-DE" dirty="0" err="1"/>
-              <a:t>bulk</a:t>
-            </a:r>
-            <a:r>
-              <a:rPr lang="de-DE" dirty="0"/>
-              <a:t> </a:t>
-            </a:r>
-            <a:r>
-              <a:rPr lang="de-DE" dirty="0" err="1"/>
-              <a:t>insert</a:t>
-            </a:r>
-            <a:r>
-              <a:rPr lang="de-DE" dirty="0"/>
-              <a:t>? Remove </a:t>
-            </a:r>
-            <a:r>
-              <a:rPr lang="de-DE" dirty="0" err="1"/>
-              <a:t>for</a:t>
-            </a:r>
-            <a:r>
-              <a:rPr lang="de-DE" dirty="0"/>
-              <a:t> </a:t>
-            </a:r>
-            <a:r>
-              <a:rPr lang="de-DE" dirty="0" err="1"/>
-              <a:t>better</a:t>
-            </a:r>
-            <a:r>
-              <a:rPr lang="de-DE" dirty="0"/>
-              <a:t> </a:t>
-            </a:r>
-            <a:r>
-              <a:rPr lang="de-DE" dirty="0" err="1"/>
-              <a:t>scale</a:t>
-            </a:r>
-            <a:r>
-              <a:rPr lang="de-DE" dirty="0"/>
-              <a:t>?)</a:t>
-            </a:r>
-          </a:p>
-          <a:p>
-            <a:endParaRPr lang="de-DE" dirty="0"/>
-          </a:p>
-          <a:p>
-            <a:pPr marL="0" marR="0" lvl="0" indent="0" algn="l" defTabSz="914400" rtl="0" eaLnBrk="1" fontAlgn="base" latinLnBrk="0" hangingPunct="1">
-              <a:lnSpc>
-                <a:spcPct val="100000"/>
-              </a:lnSpc>
-              <a:spcBef>
-                <a:spcPct val="30000"/>
-              </a:spcBef>
-              <a:spcAft>
-                <a:spcPct val="0"/>
-              </a:spcAft>
-              <a:buClrTx/>
-              <a:buSzTx/>
-              <a:buFontTx/>
-              <a:buNone/>
-              <a:tabLst/>
-              <a:defRPr/>
-            </a:pPr>
-            <a:r>
-              <a:rPr lang="de-DE" dirty="0"/>
-              <a:t>Trie </a:t>
-            </a:r>
-            <a:r>
-              <a:rPr lang="de-DE" dirty="0" err="1"/>
-              <a:t>implementation</a:t>
-            </a:r>
-            <a:r>
-              <a:rPr lang="de-DE" dirty="0"/>
-              <a:t> </a:t>
-            </a:r>
-            <a:r>
-              <a:rPr lang="de-DE" dirty="0" err="1"/>
-              <a:t>with</a:t>
-            </a:r>
-            <a:r>
-              <a:rPr lang="de-DE" dirty="0"/>
-              <a:t> </a:t>
-            </a:r>
-            <a:r>
-              <a:rPr lang="de-DE" dirty="0" err="1"/>
-              <a:t>sparse</a:t>
-            </a:r>
-            <a:r>
-              <a:rPr lang="de-DE" dirty="0"/>
-              <a:t> 16M </a:t>
-            </a:r>
-            <a:r>
-              <a:rPr lang="de-DE" dirty="0" err="1"/>
-              <a:t>takes</a:t>
-            </a:r>
-            <a:r>
-              <a:rPr lang="de-DE" dirty="0"/>
-              <a:t> </a:t>
-            </a:r>
-            <a:r>
-              <a:rPr lang="de-DE" dirty="0" err="1"/>
-              <a:t>more</a:t>
-            </a:r>
-            <a:r>
-              <a:rPr lang="de-DE" dirty="0"/>
-              <a:t> </a:t>
-            </a:r>
-            <a:r>
-              <a:rPr lang="de-DE" dirty="0" err="1"/>
-              <a:t>than</a:t>
-            </a:r>
-            <a:r>
-              <a:rPr lang="de-DE" dirty="0"/>
-              <a:t> 16GB (</a:t>
-            </a:r>
-            <a:r>
-              <a:rPr lang="de-DE" dirty="0" err="1"/>
-              <a:t>only</a:t>
-            </a:r>
-            <a:r>
-              <a:rPr lang="de-DE" dirty="0"/>
-              <a:t> </a:t>
-            </a:r>
-            <a:r>
-              <a:rPr lang="de-DE" dirty="0" err="1"/>
-              <a:t>have</a:t>
-            </a:r>
-            <a:r>
-              <a:rPr lang="de-DE" dirty="0"/>
-              <a:t> 16GB RAM so </a:t>
-            </a:r>
-            <a:r>
-              <a:rPr lang="de-DE" dirty="0" err="1"/>
-              <a:t>no</a:t>
-            </a:r>
-            <a:r>
-              <a:rPr lang="de-DE" dirty="0"/>
-              <a:t> </a:t>
-            </a:r>
-            <a:r>
-              <a:rPr lang="de-DE" dirty="0" err="1"/>
-              <a:t>value</a:t>
-            </a:r>
-            <a:r>
-              <a:rPr lang="de-DE" dirty="0"/>
-              <a:t>)</a:t>
-            </a:r>
-          </a:p>
-          <a:p>
-            <a:endParaRPr lang="de-DE" dirty="0"/>
-          </a:p>
-        </p:txBody>
-      </p:sp>
-      <p:sp>
-        <p:nvSpPr>
-          <p:cNvPr id="4" name="Slide Number Placeholder 3"/>
-          <p:cNvSpPr>
-            <a:spLocks noGrp="1"/>
-          </p:cNvSpPr>
-          <p:nvPr>
-            <p:ph type="sldNum" sz="quarter" idx="5"/>
-          </p:nvPr>
-        </p:nvSpPr>
-        <p:spPr/>
-        <p:txBody>
-          <a:bodyPr/>
-          <a:lstStyle/>
-          <a:p>
-            <a:pPr>
-              <a:defRPr/>
-            </a:pPr>
-            <a:fld id="{00AFC6D0-44D5-4EB7-828F-6F464F83D79A}" type="slidenum">
-              <a:rPr lang="en-GB" smtClean="0"/>
-              <a:pPr>
-                <a:defRPr/>
-              </a:pPr>
-              <a:t>10</a:t>
-            </a:fld>
-            <a:endParaRPr lang="en-GB"/>
-          </a:p>
-        </p:txBody>
-      </p:sp>
-    </p:spTree>
-    <p:extLst>
-      <p:ext uri="{BB962C8B-B14F-4D97-AF65-F5344CB8AC3E}">
-        <p14:creationId xmlns:p14="http://schemas.microsoft.com/office/powerpoint/2010/main" val="266720536"/>
-      </p:ext>
-    </p:extLst>
-  </p:cSld>
-  <p:clrMapOvr>
-    <a:masterClrMapping/>
-  </p:clrMapOvr>
-</p:notes>
-</file>
-
-<file path=ppt/notesSlides/notesSlide11.xml><?xml version="1.0" encoding="utf-8"?>
-<p:notes xmlns:a="http://schemas.openxmlformats.org/drawingml/2006/main" xmlns:r="http://schemas.openxmlformats.org/officeDocument/2006/relationships" xmlns:p="http://schemas.openxmlformats.org/presentationml/2006/main">
-  <p:cSld>
-    <p:spTree>
-      <p:nvGrpSpPr>
-        <p:cNvPr id="1" name=""/>
-        <p:cNvGrpSpPr/>
-        <p:nvPr/>
-      </p:nvGrpSpPr>
-      <p:grpSpPr>
-        <a:xfrm>
-          <a:off x="0" y="0"/>
-          <a:ext cx="0" cy="0"/>
-          <a:chOff x="0" y="0"/>
-          <a:chExt cx="0" cy="0"/>
-        </a:xfrm>
-      </p:grpSpPr>
-      <p:sp>
-        <p:nvSpPr>
-          <p:cNvPr id="2" name="Slide Image Placeholder 1"/>
-          <p:cNvSpPr>
-            <a:spLocks noGrp="1" noRot="1" noChangeAspect="1"/>
-          </p:cNvSpPr>
-          <p:nvPr>
-            <p:ph type="sldImg"/>
-          </p:nvPr>
-        </p:nvSpPr>
-        <p:spPr/>
-      </p:sp>
-      <p:sp>
-        <p:nvSpPr>
-          <p:cNvPr id="3" name="Notes Placeholder 2"/>
-          <p:cNvSpPr>
-            <a:spLocks noGrp="1"/>
-          </p:cNvSpPr>
-          <p:nvPr>
-            <p:ph type="body" idx="1"/>
-          </p:nvPr>
-        </p:nvSpPr>
-        <p:spPr/>
-        <p:txBody>
-          <a:bodyPr/>
-          <a:lstStyle/>
-          <a:p>
-            <a:r>
-              <a:rPr lang="de-DE" dirty="0"/>
-              <a:t>Own Implementation Performance-Benchmark (</a:t>
-            </a:r>
-            <a:r>
-              <a:rPr lang="de-DE" dirty="0" err="1"/>
               <a:t>search</a:t>
             </a:r>
             <a:r>
@@ -8052,6 +7764,22 @@
               <a:rPr lang="de-DE" dirty="0"/>
               <a:t> (a,…,z) </a:t>
             </a:r>
+            <a:r>
+              <a:rPr lang="de-DE" dirty="0" err="1"/>
+              <a:t>instead</a:t>
+            </a:r>
+            <a:r>
+              <a:rPr lang="de-DE" dirty="0"/>
+              <a:t> </a:t>
+            </a:r>
+            <a:r>
+              <a:rPr lang="de-DE" dirty="0" err="1"/>
+              <a:t>of</a:t>
+            </a:r>
+            <a:r>
+              <a:rPr lang="de-DE" dirty="0"/>
+              <a:t> 2^8 = 256</a:t>
+            </a:r>
           </a:p>
         </p:txBody>
       </p:sp>
@@ -8477,8 +8205,150 @@
             </a:r>
             <a:r>
               <a:rPr lang="de-DE" dirty="0"/>
+              <a:t> </a:t>
+            </a:r>
+            <a:r>
+              <a:rPr lang="de-DE" dirty="0" err="1"/>
+              <a:t>or</a:t>
+            </a:r>
+            <a:r>
+              <a:rPr lang="de-DE" dirty="0"/>
+              <a:t> </a:t>
+            </a:r>
+            <a:r>
+              <a:rPr lang="de-DE" dirty="0" err="1"/>
+              <a:t>store</a:t>
+            </a:r>
+            <a:r>
+              <a:rPr lang="de-DE" dirty="0"/>
+              <a:t> </a:t>
+            </a:r>
+            <a:r>
+              <a:rPr lang="de-DE" dirty="0" err="1"/>
+              <a:t>full</a:t>
+            </a:r>
+            <a:r>
+              <a:rPr lang="de-DE" dirty="0"/>
+              <a:t> </a:t>
+            </a:r>
+            <a:r>
+              <a:rPr lang="de-DE" dirty="0" err="1"/>
+              <a:t>key</a:t>
+            </a:r>
+            <a:r>
+              <a:rPr lang="de-DE" dirty="0"/>
+              <a:t> at </a:t>
+            </a:r>
+            <a:r>
+              <a:rPr lang="de-DE" dirty="0" err="1"/>
+              <a:t>leaf</a:t>
+            </a:r>
+            <a:r>
+              <a:rPr lang="de-DE" dirty="0"/>
+              <a:t>) (</a:t>
+            </a:r>
+            <a:r>
+              <a:rPr lang="de-DE" dirty="0" err="1"/>
+              <a:t>lazy</a:t>
+            </a:r>
+            <a:r>
+              <a:rPr lang="de-DE" dirty="0"/>
+              <a:t> </a:t>
+            </a:r>
+            <a:r>
+              <a:rPr lang="de-DE" dirty="0" err="1"/>
+              <a:t>expansion</a:t>
+            </a:r>
+            <a:r>
+              <a:rPr lang="de-DE" dirty="0"/>
               <a:t>)</a:t>
             </a:r>
+          </a:p>
+          <a:p>
+            <a:pPr marL="171450" indent="-171450">
+              <a:buFontTx/>
+              <a:buChar char="-"/>
+            </a:pPr>
+            <a:endParaRPr lang="de-DE" dirty="0"/>
+          </a:p>
+          <a:p>
+            <a:pPr marL="0" indent="0">
+              <a:buFontTx/>
+              <a:buNone/>
+            </a:pPr>
+            <a:r>
+              <a:rPr lang="de-DE" dirty="0"/>
+              <a:t>Will </a:t>
+            </a:r>
+            <a:r>
+              <a:rPr lang="de-DE" dirty="0" err="1"/>
+              <a:t>take</a:t>
+            </a:r>
+            <a:r>
+              <a:rPr lang="de-DE" dirty="0"/>
+              <a:t> </a:t>
+            </a:r>
+            <a:r>
+              <a:rPr lang="de-DE" dirty="0" err="1"/>
+              <a:t>closer</a:t>
+            </a:r>
+            <a:r>
+              <a:rPr lang="de-DE" dirty="0"/>
+              <a:t> </a:t>
+            </a:r>
+            <a:r>
+              <a:rPr lang="de-DE" dirty="0" err="1"/>
+              <a:t>look</a:t>
+            </a:r>
+            <a:r>
+              <a:rPr lang="de-DE" dirty="0"/>
+              <a:t> at </a:t>
+            </a:r>
+            <a:r>
+              <a:rPr lang="de-DE" dirty="0" err="1"/>
+              <a:t>vertical</a:t>
+            </a:r>
+            <a:r>
+              <a:rPr lang="de-DE" dirty="0"/>
+              <a:t> </a:t>
+            </a:r>
+            <a:r>
+              <a:rPr lang="de-DE" dirty="0" err="1"/>
+              <a:t>compression</a:t>
+            </a:r>
+            <a:r>
+              <a:rPr lang="de-DE" dirty="0"/>
+              <a:t> </a:t>
+            </a:r>
+            <a:r>
+              <a:rPr lang="de-DE" dirty="0" err="1"/>
+              <a:t>techniques</a:t>
+            </a:r>
+            <a:r>
+              <a:rPr lang="de-DE" dirty="0"/>
+              <a:t> </a:t>
+            </a:r>
+            <a:r>
+              <a:rPr lang="de-DE" dirty="0" err="1"/>
+              <a:t>used</a:t>
+            </a:r>
+            <a:r>
+              <a:rPr lang="de-DE" dirty="0"/>
+              <a:t> </a:t>
+            </a:r>
+            <a:r>
+              <a:rPr lang="de-DE" dirty="0" err="1"/>
+              <a:t>by</a:t>
+            </a:r>
+            <a:r>
+              <a:rPr lang="de-DE" dirty="0"/>
+              <a:t> </a:t>
+            </a:r>
+            <a:r>
+              <a:rPr lang="de-DE" dirty="0" err="1"/>
+              <a:t>art</a:t>
+            </a:r>
+            <a:endParaRPr lang="de-DE" dirty="0"/>
           </a:p>
         </p:txBody>
       </p:sp>
@@ -8570,32 +8440,24 @@
           <a:p>
             <a:r>
               <a:rPr lang="de-DE" dirty="0"/>
-              <a:t>Also </a:t>
+              <a:t>Own Implementation Memory-Benchmark:</a:t>
+            </a:r>
+          </a:p>
+          <a:p>
+            <a:endParaRPr lang="de-DE" dirty="0"/>
+          </a:p>
+          <a:p>
+            <a:r>
+              <a:rPr lang="de-DE" dirty="0"/>
+              <a:t>Trie </a:t>
             </a:r>
             <a:r>
               <a:rPr lang="de-DE" dirty="0" err="1"/>
-              <a:t>called</a:t>
-            </a:r>
-            <a:r>
-              <a:rPr lang="de-DE" dirty="0"/>
-              <a:t> Patricia-</a:t>
-            </a:r>
-            <a:r>
-              <a:rPr lang="de-DE" dirty="0" err="1"/>
-              <a:t>Trees</a:t>
-            </a:r>
-            <a:r>
-              <a:rPr lang="de-DE" dirty="0"/>
-              <a:t>.</a:t>
-            </a:r>
-          </a:p>
-          <a:p>
-            <a:endParaRPr lang="de-DE" dirty="0"/>
-          </a:p>
-          <a:p>
-            <a:r>
-              <a:rPr lang="de-DE" dirty="0"/>
-              <a:t>Nodes </a:t>
+              <a:t>implementation</a:t>
+            </a:r>
+            <a:r>
+              <a:rPr lang="de-DE" dirty="0"/>
+              <a:t> </a:t>
             </a:r>
             <a:r>
               <a:rPr lang="de-DE" dirty="0" err="1"/>
@@ -8607,15 +8469,55 @@
             </a:r>
             <a:r>
               <a:rPr lang="de-DE" dirty="0" err="1"/>
+              <a:t>sparse</a:t>
+            </a:r>
+            <a:r>
+              <a:rPr lang="de-DE" dirty="0"/>
+              <a:t> 16M </a:t>
+            </a:r>
+            <a:r>
+              <a:rPr lang="de-DE" dirty="0" err="1"/>
+              <a:t>takes</a:t>
+            </a:r>
+            <a:r>
+              <a:rPr lang="de-DE" dirty="0"/>
+              <a:t> </a:t>
+            </a:r>
+            <a:r>
+              <a:rPr lang="de-DE" dirty="0" err="1"/>
+              <a:t>more</a:t>
+            </a:r>
+            <a:r>
+              <a:rPr lang="de-DE" dirty="0"/>
+              <a:t> </a:t>
+            </a:r>
+            <a:r>
+              <a:rPr lang="de-DE" dirty="0" err="1"/>
+              <a:t>than</a:t>
+            </a:r>
+            <a:r>
+              <a:rPr lang="de-DE" dirty="0"/>
+              <a:t> 16GB (</a:t>
+            </a:r>
+            <a:r>
+              <a:rPr lang="de-DE" dirty="0" err="1"/>
               <a:t>only</a:t>
             </a:r>
             <a:r>
               <a:rPr lang="de-DE" dirty="0"/>
-              <a:t> 1 </a:t>
+              <a:t> </a:t>
             </a:r>
             <a:r>
               <a:rPr lang="de-DE" dirty="0" err="1"/>
-              <a:t>child</a:t>
+              <a:t>have</a:t>
+            </a:r>
+            <a:r>
+              <a:rPr lang="de-DE" dirty="0"/>
+              <a:t> 16GB RAM so </a:t>
+            </a:r>
+            <a:r>
+              <a:rPr lang="de-DE" dirty="0" err="1"/>
+              <a:t>no</a:t>
             </a:r>
             <a:r>
               <a:rPr lang="de-DE" dirty="0"/>
@@ -8623,284 +8525,7 @@
             </a:r>
             <a:r>
               <a:rPr lang="de-DE" dirty="0" err="1"/>
-              <a:t>get</a:t>
-            </a:r>
-            <a:r>
-              <a:rPr lang="de-DE" dirty="0"/>
-              <a:t> </a:t>
-            </a:r>
-            <a:r>
-              <a:rPr lang="de-DE" dirty="0" err="1"/>
-              <a:t>merged</a:t>
-            </a:r>
-            <a:r>
-              <a:rPr lang="de-DE" dirty="0"/>
-              <a:t> </a:t>
-            </a:r>
-            <a:r>
-              <a:rPr lang="de-DE" dirty="0" err="1"/>
-              <a:t>with</a:t>
-            </a:r>
-            <a:r>
-              <a:rPr lang="de-DE" dirty="0"/>
-              <a:t> </a:t>
-            </a:r>
-            <a:r>
-              <a:rPr lang="de-DE" dirty="0" err="1"/>
-              <a:t>parent</a:t>
-            </a:r>
-            <a:r>
-              <a:rPr lang="de-DE" dirty="0"/>
-              <a:t>. (</a:t>
-            </a:r>
-            <a:r>
-              <a:rPr lang="de-DE" dirty="0" err="1"/>
-              <a:t>Vertical</a:t>
-            </a:r>
-            <a:r>
-              <a:rPr lang="de-DE" dirty="0"/>
-              <a:t> </a:t>
-            </a:r>
-            <a:r>
-              <a:rPr lang="de-DE" dirty="0" err="1"/>
-              <a:t>Compression</a:t>
-            </a:r>
-            <a:r>
-              <a:rPr lang="de-DE" dirty="0"/>
-              <a:t>)</a:t>
-            </a:r>
-          </a:p>
-          <a:p>
-            <a:endParaRPr lang="de-DE" dirty="0"/>
-          </a:p>
-          <a:p>
-            <a:r>
-              <a:rPr lang="de-DE" dirty="0"/>
-              <a:t>„</a:t>
-            </a:r>
-            <a:r>
-              <a:rPr lang="de-DE" dirty="0" err="1"/>
-              <a:t>Merging</a:t>
-            </a:r>
-            <a:r>
-              <a:rPr lang="de-DE" dirty="0"/>
-              <a:t>“ </a:t>
-            </a:r>
-            <a:r>
-              <a:rPr lang="de-DE" dirty="0" err="1"/>
-              <a:t>is</a:t>
-            </a:r>
-            <a:r>
-              <a:rPr lang="de-DE" dirty="0"/>
-              <a:t> </a:t>
-            </a:r>
-            <a:r>
-              <a:rPr lang="de-DE" dirty="0" err="1"/>
-              <a:t>implementation</a:t>
-            </a:r>
-            <a:r>
-              <a:rPr lang="de-DE" dirty="0"/>
-              <a:t> </a:t>
-            </a:r>
-            <a:r>
-              <a:rPr lang="de-DE" dirty="0" err="1"/>
-              <a:t>specific</a:t>
-            </a:r>
-            <a:r>
-              <a:rPr lang="de-DE" dirty="0"/>
-              <a:t>:</a:t>
-            </a:r>
-          </a:p>
-          <a:p>
-            <a:pPr marL="171450" indent="-171450">
-              <a:buFontTx/>
-              <a:buChar char="-"/>
-            </a:pPr>
-            <a:r>
-              <a:rPr lang="de-DE" dirty="0"/>
-              <a:t>Store </a:t>
-            </a:r>
-            <a:r>
-              <a:rPr lang="de-DE" dirty="0" err="1"/>
-              <a:t>edge</a:t>
-            </a:r>
-            <a:r>
-              <a:rPr lang="de-DE" dirty="0"/>
-              <a:t> </a:t>
-            </a:r>
-            <a:r>
-              <a:rPr lang="de-DE" dirty="0" err="1"/>
-              <a:t>strings</a:t>
-            </a:r>
-            <a:r>
-              <a:rPr lang="de-DE" dirty="0"/>
-              <a:t> in </a:t>
-            </a:r>
-            <a:r>
-              <a:rPr lang="de-DE" dirty="0" err="1"/>
-              <a:t>constant</a:t>
-            </a:r>
-            <a:r>
-              <a:rPr lang="de-DE" dirty="0"/>
-              <a:t> </a:t>
-            </a:r>
-            <a:r>
-              <a:rPr lang="de-DE" dirty="0" err="1"/>
-              <a:t>space</a:t>
-            </a:r>
-            <a:r>
-              <a:rPr lang="de-DE" dirty="0"/>
-              <a:t> </a:t>
-            </a:r>
-            <a:r>
-              <a:rPr lang="de-DE" dirty="0" err="1"/>
-              <a:t>with</a:t>
-            </a:r>
-            <a:r>
-              <a:rPr lang="de-DE" dirty="0"/>
-              <a:t> </a:t>
-            </a:r>
-            <a:r>
-              <a:rPr lang="de-DE" dirty="0" err="1"/>
-              <a:t>two</a:t>
-            </a:r>
-            <a:r>
-              <a:rPr lang="de-DE" dirty="0"/>
-              <a:t> </a:t>
-            </a:r>
-            <a:r>
-              <a:rPr lang="de-DE" dirty="0" err="1"/>
-              <a:t>pointers</a:t>
-            </a:r>
-            <a:r>
-              <a:rPr lang="de-DE" dirty="0"/>
-              <a:t> (</a:t>
-            </a:r>
-            <a:r>
-              <a:rPr lang="de-DE" dirty="0" err="1"/>
-              <a:t>start</a:t>
-            </a:r>
-            <a:r>
-              <a:rPr lang="de-DE" dirty="0"/>
-              <a:t> &amp; end </a:t>
-            </a:r>
-            <a:r>
-              <a:rPr lang="de-DE" dirty="0" err="1"/>
-              <a:t>string</a:t>
-            </a:r>
-            <a:r>
-              <a:rPr lang="de-DE" dirty="0"/>
-              <a:t>)</a:t>
-            </a:r>
-          </a:p>
-          <a:p>
-            <a:pPr marL="171450" indent="-171450">
-              <a:buFontTx/>
-              <a:buChar char="-"/>
-            </a:pPr>
-            <a:r>
-              <a:rPr lang="de-DE" dirty="0"/>
-              <a:t>Index </a:t>
-            </a:r>
-            <a:r>
-              <a:rPr lang="de-DE" dirty="0" err="1"/>
-              <a:t>Structure</a:t>
-            </a:r>
-            <a:r>
-              <a:rPr lang="de-DE" dirty="0"/>
-              <a:t>: Just </a:t>
-            </a:r>
-            <a:r>
-              <a:rPr lang="de-DE" dirty="0" err="1"/>
-              <a:t>omit</a:t>
-            </a:r>
-            <a:r>
-              <a:rPr lang="de-DE" dirty="0"/>
-              <a:t> intermediate </a:t>
-            </a:r>
-            <a:r>
-              <a:rPr lang="de-DE" dirty="0" err="1"/>
-              <a:t>nodes</a:t>
-            </a:r>
-            <a:r>
-              <a:rPr lang="de-DE" dirty="0"/>
-              <a:t> and just </a:t>
-            </a:r>
-            <a:r>
-              <a:rPr lang="de-DE" dirty="0" err="1"/>
-              <a:t>optimistally</a:t>
-            </a:r>
-            <a:r>
-              <a:rPr lang="de-DE" dirty="0"/>
-              <a:t> </a:t>
-            </a:r>
-            <a:r>
-              <a:rPr lang="de-DE" dirty="0" err="1"/>
-              <a:t>assume</a:t>
-            </a:r>
-            <a:r>
-              <a:rPr lang="de-DE" dirty="0"/>
-              <a:t> </a:t>
-            </a:r>
-            <a:r>
-              <a:rPr lang="de-DE" dirty="0" err="1"/>
-              <a:t>the</a:t>
-            </a:r>
-            <a:r>
-              <a:rPr lang="de-DE" dirty="0"/>
-              <a:t> </a:t>
-            </a:r>
-            <a:r>
-              <a:rPr lang="de-DE" dirty="0" err="1"/>
-              <a:t>rest</a:t>
-            </a:r>
-            <a:r>
-              <a:rPr lang="de-DE" dirty="0"/>
-              <a:t> </a:t>
-            </a:r>
-            <a:r>
-              <a:rPr lang="de-DE" dirty="0" err="1"/>
-              <a:t>of</a:t>
-            </a:r>
-            <a:r>
-              <a:rPr lang="de-DE" dirty="0"/>
-              <a:t> </a:t>
-            </a:r>
-            <a:r>
-              <a:rPr lang="de-DE" dirty="0" err="1"/>
-              <a:t>the</a:t>
-            </a:r>
-            <a:r>
-              <a:rPr lang="de-DE" dirty="0"/>
-              <a:t> </a:t>
-            </a:r>
-            <a:r>
-              <a:rPr lang="de-DE" dirty="0" err="1"/>
-              <a:t>key</a:t>
-            </a:r>
-            <a:r>
-              <a:rPr lang="de-DE" dirty="0"/>
-              <a:t> will match (check </a:t>
-            </a:r>
-            <a:r>
-              <a:rPr lang="de-DE" dirty="0" err="1"/>
-              <a:t>with</a:t>
-            </a:r>
-            <a:r>
-              <a:rPr lang="de-DE" dirty="0"/>
-              <a:t> </a:t>
-            </a:r>
-            <a:r>
-              <a:rPr lang="de-DE" dirty="0" err="1"/>
-              <a:t>tuple</a:t>
-            </a:r>
-            <a:r>
-              <a:rPr lang="de-DE" dirty="0"/>
-              <a:t> </a:t>
-            </a:r>
-            <a:r>
-              <a:rPr lang="de-DE" dirty="0" err="1"/>
-              <a:t>entry</a:t>
+              <a:t>value</a:t>
             </a:r>
             <a:r>
               <a:rPr lang="de-DE" dirty="0"/>
@@ -8932,7 +8557,7 @@
               <a:pPr>
                 <a:defRPr/>
               </a:pPr>
-              <a:t>8</a:t>
+              <a:t>9</a:t>
             </a:fld>
             <a:endParaRPr lang="en-GB"/>
           </a:p>
@@ -8941,7 +8566,7 @@
     </p:spTree>
     <p:extLst>
       <p:ext uri="{BB962C8B-B14F-4D97-AF65-F5344CB8AC3E}">
-        <p14:creationId xmlns:p14="http://schemas.microsoft.com/office/powerpoint/2010/main" val="3758309799"/>
+        <p14:creationId xmlns:p14="http://schemas.microsoft.com/office/powerpoint/2010/main" val="822838596"/>
       </p:ext>
     </p:extLst>
   </p:cSld>
@@ -8997,13 +8622,116 @@
           <a:p>
             <a:r>
               <a:rPr lang="de-DE" dirty="0"/>
-              <a:t>Own Implementation Memory-Benchmark:</a:t>
+              <a:t>Own Implementation Performance-Benchmark (</a:t>
+            </a:r>
+            <a:r>
+              <a:rPr lang="de-DE" dirty="0" err="1"/>
+              <a:t>insert</a:t>
+            </a:r>
+            <a:r>
+              <a:rPr lang="de-DE" dirty="0"/>
+              <a:t>):</a:t>
+            </a:r>
+          </a:p>
+          <a:p>
+            <a:r>
+              <a:rPr lang="de-DE" dirty="0"/>
+              <a:t>(Remove </a:t>
+            </a:r>
+            <a:r>
+              <a:rPr lang="de-DE" dirty="0" err="1"/>
+              <a:t>Sorted</a:t>
+            </a:r>
+            <a:r>
+              <a:rPr lang="de-DE" dirty="0"/>
+              <a:t> List </a:t>
+            </a:r>
+            <a:r>
+              <a:rPr lang="de-DE" dirty="0" err="1"/>
+              <a:t>as</a:t>
+            </a:r>
+            <a:r>
+              <a:rPr lang="de-DE" dirty="0"/>
+              <a:t> </a:t>
+            </a:r>
+            <a:r>
+              <a:rPr lang="de-DE" dirty="0" err="1"/>
+              <a:t>it‘s</a:t>
+            </a:r>
+            <a:r>
+              <a:rPr lang="de-DE" dirty="0"/>
+              <a:t> </a:t>
+            </a:r>
+            <a:r>
+              <a:rPr lang="de-DE" dirty="0" err="1"/>
+              <a:t>only</a:t>
+            </a:r>
+            <a:r>
+              <a:rPr lang="de-DE" dirty="0"/>
+              <a:t> </a:t>
+            </a:r>
+            <a:r>
+              <a:rPr lang="de-DE" dirty="0" err="1"/>
+              <a:t>bulk</a:t>
+            </a:r>
+            <a:r>
+              <a:rPr lang="de-DE" dirty="0"/>
+              <a:t> </a:t>
+            </a:r>
+            <a:r>
+              <a:rPr lang="de-DE" dirty="0" err="1"/>
+              <a:t>insert</a:t>
+            </a:r>
+            <a:r>
+              <a:rPr lang="de-DE" dirty="0"/>
+              <a:t>? Remove </a:t>
+            </a:r>
+            <a:r>
+              <a:rPr lang="de-DE" dirty="0" err="1"/>
+              <a:t>for</a:t>
+            </a:r>
+            <a:r>
+              <a:rPr lang="de-DE" dirty="0"/>
+              <a:t> </a:t>
+            </a:r>
+            <a:r>
+              <a:rPr lang="de-DE" dirty="0" err="1"/>
+              <a:t>better</a:t>
+            </a:r>
+            <a:r>
+              <a:rPr lang="de-DE" dirty="0"/>
+              <a:t> </a:t>
+            </a:r>
+            <a:r>
+              <a:rPr lang="de-DE" dirty="0" err="1"/>
+              <a:t>scale</a:t>
+            </a:r>
+            <a:r>
+              <a:rPr lang="de-DE" dirty="0"/>
+              <a:t>?)</a:t>
             </a:r>
           </a:p>
           <a:p>
             <a:endParaRPr lang="de-DE" dirty="0"/>
           </a:p>
           <a:p>
+            <a:pPr marL="0" marR="0" lvl="0" indent="0" algn="l" defTabSz="914400" rtl="0" eaLnBrk="1" fontAlgn="base" latinLnBrk="0" hangingPunct="1">
+              <a:lnSpc>
+                <a:spcPct val="100000"/>
+              </a:lnSpc>
+              <a:spcBef>
+                <a:spcPct val="30000"/>
+              </a:spcBef>
+              <a:spcAft>
+                <a:spcPct val="0"/>
+              </a:spcAft>
+              <a:buClrTx/>
+              <a:buSzTx/>
+              <a:buFontTx/>
+              <a:buNone/>
+              <a:tabLst/>
+              <a:defRPr/>
+            </a:pPr>
             <a:r>
               <a:rPr lang="de-DE" dirty="0"/>
               <a:t>Trie </a:t>
@@ -9088,6 +8816,9 @@
               <a:rPr lang="de-DE" dirty="0"/>
               <a:t>)</a:t>
             </a:r>
+          </a:p>
+          <a:p>
+            <a:endParaRPr lang="de-DE" dirty="0"/>
           </a:p>
         </p:txBody>
       </p:sp>
@@ -9114,7 +8845,7 @@
               <a:pPr>
                 <a:defRPr/>
               </a:pPr>
-              <a:t>9</a:t>
+              <a:t>10</a:t>
             </a:fld>
             <a:endParaRPr lang="en-GB"/>
           </a:p>
@@ -9123,7 +8854,7 @@
     </p:spTree>
     <p:extLst>
       <p:ext uri="{BB962C8B-B14F-4D97-AF65-F5344CB8AC3E}">
-        <p14:creationId xmlns:p14="http://schemas.microsoft.com/office/powerpoint/2010/main" val="822838596"/>
+        <p14:creationId xmlns:p14="http://schemas.microsoft.com/office/powerpoint/2010/main" val="266720536"/>
       </p:ext>
     </p:extLst>
   </p:cSld>
@@ -17791,7 +17522,7 @@
               <a:t>Chair </a:t>
             </a:r>
             <a:r>
-              <a:rPr lang="de-DE" dirty="0" err="1"/>
+              <a:rPr lang="en-US" dirty="0"/>
               <a:t>for</a:t>
             </a:r>
             <a:r>
@@ -17799,7 +17530,7 @@
               <a:t> </a:t>
             </a:r>
             <a:r>
-              <a:rPr lang="de-DE" dirty="0" err="1"/>
+              <a:rPr lang="en-US" dirty="0"/>
               <a:t>database</a:t>
             </a:r>
             <a:r>
@@ -27060,6 +26791,51 @@
               <a:t>    </a:t>
             </a:r>
             <a:r>
+              <a:rPr lang="de-DE" dirty="0">
+                <a:solidFill>
+                  <a:schemeClr val="bg1">
+                    <a:lumMod val="50000"/>
+                  </a:schemeClr>
+                </a:solidFill>
+                <a:latin typeface="Cascadia Code" panose="020B0609020000020004" pitchFamily="49" charset="0"/>
+                <a:cs typeface="Cascadia Code" panose="020B0609020000020004" pitchFamily="49" charset="0"/>
+              </a:rPr>
+              <a:t>// ‘A‘ </a:t>
+            </a:r>
+            <a:r>
+              <a:rPr lang="de-DE" dirty="0" err="1">
+                <a:solidFill>
+                  <a:schemeClr val="bg1">
+                    <a:lumMod val="50000"/>
+                  </a:schemeClr>
+                </a:solidFill>
+                <a:latin typeface="Cascadia Code" panose="020B0609020000020004" pitchFamily="49" charset="0"/>
+                <a:cs typeface="Cascadia Code" panose="020B0609020000020004" pitchFamily="49" charset="0"/>
+              </a:rPr>
+              <a:t>to</a:t>
+            </a:r>
+            <a:r>
+              <a:rPr lang="de-DE" dirty="0">
+                <a:solidFill>
+                  <a:schemeClr val="bg1">
+                    <a:lumMod val="50000"/>
+                  </a:schemeClr>
+                </a:solidFill>
+                <a:latin typeface="Cascadia Code" panose="020B0609020000020004" pitchFamily="49" charset="0"/>
+                <a:cs typeface="Cascadia Code" panose="020B0609020000020004" pitchFamily="49" charset="0"/>
+              </a:rPr>
+              <a:t> ‘Z‘</a:t>
+            </a:r>
+          </a:p>
+          <a:p>
+            <a:r>
+              <a:rPr lang="de-DE" dirty="0">
+                <a:latin typeface="Cascadia Code" panose="020B0609020000020004" pitchFamily="49" charset="0"/>
+                <a:cs typeface="Cascadia Code" panose="020B0609020000020004" pitchFamily="49" charset="0"/>
+              </a:rPr>
+              <a:t>    </a:t>
+            </a:r>
+            <a:r>
               <a:rPr lang="de-DE" dirty="0" err="1">
                 <a:latin typeface="Cascadia Code" panose="020B0609020000020004" pitchFamily="49" charset="0"/>
                 <a:cs typeface="Cascadia Code" panose="020B0609020000020004" pitchFamily="49" charset="0"/>
@@ -27393,11 +27169,15 @@
             <a:avLst/>
           </a:prstGeom>
           <a:solidFill>
-            <a:schemeClr val="accent1"/>
+            <a:schemeClr val="accent1">
+              <a:alpha val="50000"/>
+            </a:schemeClr>
           </a:solidFill>
           <a:ln w="38100">
             <a:solidFill>
-              <a:schemeClr val="accent6"/>
+              <a:schemeClr val="accent6">
+                <a:alpha val="50000"/>
+              </a:schemeClr>
             </a:solidFill>
           </a:ln>
         </p:spPr>
@@ -27458,6 +27238,11 @@
           <a:prstGeom prst="rect">
             <a:avLst/>
           </a:prstGeom>
+          <a:solidFill>
+            <a:schemeClr val="accent1">
+              <a:alpha val="50000"/>
+            </a:schemeClr>
+          </a:solidFill>
           <a:ln>
             <a:noFill/>
           </a:ln>
@@ -27520,11 +27305,15 @@
             <a:avLst/>
           </a:prstGeom>
           <a:solidFill>
-            <a:schemeClr val="accent1"/>
+            <a:schemeClr val="accent1">
+              <a:alpha val="50000"/>
+            </a:schemeClr>
           </a:solidFill>
           <a:ln w="38100">
             <a:solidFill>
-              <a:schemeClr val="accent6"/>
+              <a:schemeClr val="accent6">
+                <a:alpha val="50000"/>
+              </a:schemeClr>
             </a:solidFill>
           </a:ln>
         </p:spPr>
@@ -27585,6 +27374,11 @@
           <a:prstGeom prst="rect">
             <a:avLst/>
           </a:prstGeom>
+          <a:solidFill>
+            <a:schemeClr val="accent1">
+              <a:alpha val="50000"/>
+            </a:schemeClr>
+          </a:solidFill>
           <a:ln>
             <a:noFill/>
           </a:ln>
@@ -27646,6 +27440,11 @@
           <a:prstGeom prst="rect">
             <a:avLst/>
           </a:prstGeom>
+          <a:solidFill>
+            <a:schemeClr val="accent1">
+              <a:alpha val="50000"/>
+            </a:schemeClr>
+          </a:solidFill>
           <a:ln>
             <a:noFill/>
           </a:ln>
@@ -27708,11 +27507,15 @@
             <a:avLst/>
           </a:prstGeom>
           <a:solidFill>
-            <a:schemeClr val="accent1"/>
+            <a:schemeClr val="accent1">
+              <a:alpha val="50000"/>
+            </a:schemeClr>
           </a:solidFill>
           <a:ln w="38100">
             <a:solidFill>
-              <a:schemeClr val="accent6"/>
+              <a:schemeClr val="accent6">
+                <a:alpha val="50000"/>
+              </a:schemeClr>
             </a:solidFill>
           </a:ln>
         </p:spPr>
@@ -27823,7 +27626,9 @@
           </a:prstGeom>
           <a:ln w="63500">
             <a:solidFill>
-              <a:schemeClr val="accent3"/>
+              <a:schemeClr val="accent3">
+                <a:alpha val="50000"/>
+              </a:schemeClr>
             </a:solidFill>
             <a:tailEnd type="triangle"/>
           </a:ln>
@@ -27869,7 +27674,9 @@
           </a:prstGeom>
           <a:ln w="63500">
             <a:solidFill>
-              <a:schemeClr val="accent3"/>
+              <a:schemeClr val="accent3">
+                <a:alpha val="50000"/>
+              </a:schemeClr>
             </a:solidFill>
             <a:tailEnd type="triangle"/>
           </a:ln>
@@ -27915,7 +27722,9 @@
           </a:prstGeom>
           <a:ln w="63500">
             <a:solidFill>
-              <a:schemeClr val="accent3"/>
+              <a:schemeClr val="accent3">
+                <a:alpha val="50000"/>
+              </a:schemeClr>
             </a:solidFill>
             <a:tailEnd type="triangle"/>
           </a:ln>
@@ -27961,7 +27770,9 @@
           </a:prstGeom>
           <a:ln w="63500">
             <a:solidFill>
-              <a:schemeClr val="accent3"/>
+              <a:schemeClr val="accent3">
+                <a:alpha val="50000"/>
+              </a:schemeClr>
             </a:solidFill>
             <a:tailEnd type="triangle"/>
           </a:ln>
@@ -28007,7 +27818,9 @@
           </a:prstGeom>
           <a:ln w="63500">
             <a:solidFill>
-              <a:schemeClr val="accent3"/>
+              <a:schemeClr val="accent3">
+                <a:alpha val="50000"/>
+              </a:schemeClr>
             </a:solidFill>
             <a:tailEnd type="triangle"/>
           </a:ln>
@@ -28044,7 +27857,7 @@
         <p:spPr>
           <a:xfrm>
             <a:off x="1219171" y="1762188"/>
-            <a:ext cx="1791669" cy="4699572"/>
+            <a:ext cx="757507" cy="4699572"/>
           </a:xfrm>
           <a:prstGeom prst="rect">
             <a:avLst/>
@@ -28268,7 +28081,7 @@
         </p:nvSpPr>
         <p:spPr>
           <a:xfrm>
-            <a:off x="5917557" y="3225505"/>
+            <a:off x="5917557" y="3604646"/>
             <a:ext cx="546411" cy="410370"/>
           </a:xfrm>
           <a:prstGeom prst="rect">
@@ -28329,7 +28142,7 @@
         </p:nvSpPr>
         <p:spPr>
           <a:xfrm>
-            <a:off x="5058931" y="4047040"/>
+            <a:off x="5058931" y="4426181"/>
             <a:ext cx="546411" cy="410370"/>
           </a:xfrm>
           <a:prstGeom prst="rect">
@@ -28390,7 +28203,7 @@
         </p:nvSpPr>
         <p:spPr>
           <a:xfrm>
-            <a:off x="7383944" y="4042453"/>
+            <a:off x="7383944" y="4421594"/>
             <a:ext cx="546411" cy="420118"/>
           </a:xfrm>
           <a:prstGeom prst="rect">
@@ -28454,7 +28267,7 @@
         </p:nvCxnSpPr>
         <p:spPr>
           <a:xfrm flipH="1">
-            <a:off x="5605342" y="3635875"/>
+            <a:off x="5605342" y="4015016"/>
             <a:ext cx="585421" cy="406578"/>
           </a:xfrm>
           <a:prstGeom prst="straightConnector1">
@@ -28499,7 +28312,7 @@
         </p:nvCxnSpPr>
         <p:spPr>
           <a:xfrm flipH="1">
-            <a:off x="5332135" y="4457410"/>
+            <a:off x="5332135" y="4836551"/>
             <a:ext cx="2" cy="485171"/>
           </a:xfrm>
           <a:prstGeom prst="straightConnector1">
@@ -28544,7 +28357,7 @@
         </p:nvCxnSpPr>
         <p:spPr>
           <a:xfrm>
-            <a:off x="7657150" y="4462571"/>
+            <a:off x="7657150" y="4841712"/>
             <a:ext cx="0" cy="517737"/>
           </a:xfrm>
           <a:prstGeom prst="straightConnector1">
@@ -28586,7 +28399,7 @@
         </p:nvSpPr>
         <p:spPr>
           <a:xfrm>
-            <a:off x="5638795" y="4047040"/>
+            <a:off x="5638795" y="4426181"/>
             <a:ext cx="546411" cy="410370"/>
           </a:xfrm>
           <a:prstGeom prst="rect">
@@ -28647,7 +28460,7 @@
         </p:nvSpPr>
         <p:spPr>
           <a:xfrm>
-            <a:off x="6224216" y="4042452"/>
+            <a:off x="6224216" y="4421593"/>
             <a:ext cx="546411" cy="414957"/>
           </a:xfrm>
           <a:prstGeom prst="rect">
@@ -28708,7 +28521,7 @@
         </p:nvSpPr>
         <p:spPr>
           <a:xfrm>
-            <a:off x="6804080" y="4042453"/>
+            <a:off x="6804080" y="4421594"/>
             <a:ext cx="546411" cy="420118"/>
           </a:xfrm>
           <a:prstGeom prst="rect">
@@ -28769,7 +28582,7 @@
         </p:nvSpPr>
         <p:spPr>
           <a:xfrm>
-            <a:off x="7930355" y="3905798"/>
+            <a:off x="7930355" y="4284939"/>
             <a:ext cx="524905" cy="450188"/>
           </a:xfrm>
           <a:prstGeom prst="rect">
@@ -28811,7 +28624,7 @@
         </p:nvSpPr>
         <p:spPr>
           <a:xfrm>
-            <a:off x="8471137" y="4042453"/>
+            <a:off x="8471137" y="4421594"/>
             <a:ext cx="546411" cy="420118"/>
           </a:xfrm>
           <a:prstGeom prst="rect">
@@ -28872,7 +28685,7 @@
         </p:nvSpPr>
         <p:spPr>
           <a:xfrm>
-            <a:off x="5080437" y="4729040"/>
+            <a:off x="5080437" y="5108181"/>
             <a:ext cx="524905" cy="450188"/>
           </a:xfrm>
           <a:prstGeom prst="rect">
@@ -28914,49 +28727,7 @@
         </p:nvSpPr>
         <p:spPr>
           <a:xfrm>
-            <a:off x="7433999" y="4774999"/>
-            <a:ext cx="524905" cy="450188"/>
-          </a:xfrm>
-          <a:prstGeom prst="rect">
-            <a:avLst/>
-          </a:prstGeom>
-          <a:noFill/>
-        </p:spPr>
-        <p:txBody>
-          <a:bodyPr wrap="square" lIns="0" tIns="0" rIns="0" bIns="0" rtlCol="0" anchor="ctr">
-            <a:spAutoFit/>
-          </a:bodyPr>
-          <a:lstStyle/>
-          <a:p>
-            <a:pPr algn="ctr">
-              <a:lnSpc>
-                <a:spcPct val="114000"/>
-              </a:lnSpc>
-            </a:pPr>
-            <a:r>
-              <a:rPr lang="de-DE" sz="2800" b="1" dirty="0">
-                <a:latin typeface="+mn-lt"/>
-              </a:rPr>
-              <a:t>…</a:t>
-            </a:r>
-          </a:p>
-        </p:txBody>
-      </p:sp>
-      <p:sp>
-        <p:nvSpPr>
-          <p:cNvPr id="47" name="TextBox 46">
-            <a:extLst>
-              <a:ext uri="{FF2B5EF4-FFF2-40B4-BE49-F238E27FC236}">
-                <a16:creationId xmlns:a16="http://schemas.microsoft.com/office/drawing/2014/main" id="{0A6E1EF5-14CA-1EBA-2D56-22FCF7278F47}"/>
-              </a:ext>
-            </a:extLst>
-          </p:cNvPr>
-          <p:cNvSpPr txBox="1"/>
-          <p:nvPr/>
-        </p:nvSpPr>
-        <p:spPr>
-          <a:xfrm>
-            <a:off x="5452111" y="5011128"/>
+            <a:off x="7433999" y="5154140"/>
             <a:ext cx="524905" cy="450188"/>
           </a:xfrm>
           <a:prstGeom prst="rect">
@@ -29119,7 +28890,7 @@
         <p:spPr>
           <a:xfrm>
             <a:off x="3397403" y="1762188"/>
-            <a:ext cx="546411" cy="410370"/>
+            <a:ext cx="706246" cy="410370"/>
           </a:xfrm>
           <a:prstGeom prst="rect">
             <a:avLst/>
@@ -29160,7 +28931,7 @@
             </a:pPr>
             <a:r>
               <a:rPr lang="de-DE" dirty="0"/>
-              <a:t>H</a:t>
+              <a:t>0x48</a:t>
             </a:r>
           </a:p>
         </p:txBody>
@@ -29179,8 +28950,8 @@
         </p:nvSpPr>
         <p:spPr>
           <a:xfrm>
-            <a:off x="2750630" y="2662316"/>
-            <a:ext cx="546411" cy="410370"/>
+            <a:off x="2609386" y="2662316"/>
+            <a:ext cx="687656" cy="410370"/>
           </a:xfrm>
           <a:prstGeom prst="rect">
             <a:avLst/>
@@ -29221,7 +28992,7 @@
             </a:pPr>
             <a:r>
               <a:rPr lang="de-DE" dirty="0"/>
-              <a:t>A</a:t>
+              <a:t>0x41</a:t>
             </a:r>
           </a:p>
         </p:txBody>
@@ -29241,7 +29012,7 @@
         <p:spPr>
           <a:xfrm>
             <a:off x="3330494" y="2662316"/>
-            <a:ext cx="546411" cy="410370"/>
+            <a:ext cx="687656" cy="410370"/>
           </a:xfrm>
           <a:prstGeom prst="rect">
             <a:avLst/>
@@ -29282,7 +29053,7 @@
             </a:pPr>
             <a:r>
               <a:rPr lang="de-DE" dirty="0"/>
-              <a:t>E</a:t>
+              <a:t>0x45</a:t>
             </a:r>
           </a:p>
         </p:txBody>
@@ -29301,8 +29072,8 @@
         </p:nvSpPr>
         <p:spPr>
           <a:xfrm>
-            <a:off x="1921719" y="3562444"/>
-            <a:ext cx="546411" cy="410370"/>
+            <a:off x="1780475" y="3562444"/>
+            <a:ext cx="687655" cy="410370"/>
           </a:xfrm>
           <a:prstGeom prst="rect">
             <a:avLst/>
@@ -29348,7 +29119,7 @@
             </a:pPr>
             <a:r>
               <a:rPr lang="de-DE" dirty="0"/>
-              <a:t>T</a:t>
+              <a:t>0x54</a:t>
             </a:r>
           </a:p>
         </p:txBody>
@@ -29368,7 +29139,7 @@
         <p:spPr>
           <a:xfrm>
             <a:off x="2501583" y="3562444"/>
-            <a:ext cx="546411" cy="410370"/>
+            <a:ext cx="687655" cy="410370"/>
           </a:xfrm>
           <a:prstGeom prst="rect">
             <a:avLst/>
@@ -29409,7 +29180,7 @@
             </a:pPr>
             <a:r>
               <a:rPr lang="de-DE" dirty="0"/>
-              <a:t>V</a:t>
+              <a:t>0x56</a:t>
             </a:r>
           </a:p>
         </p:txBody>
@@ -29428,8 +29199,8 @@
         </p:nvSpPr>
         <p:spPr>
           <a:xfrm>
-            <a:off x="2501583" y="4462572"/>
-            <a:ext cx="546411" cy="410370"/>
+            <a:off x="2360341" y="4462572"/>
+            <a:ext cx="687654" cy="410370"/>
           </a:xfrm>
           <a:prstGeom prst="rect">
             <a:avLst/>
@@ -29475,7 +29246,7 @@
             </a:pPr>
             <a:r>
               <a:rPr lang="de-DE" dirty="0"/>
-              <a:t>E</a:t>
+              <a:t>0x45</a:t>
             </a:r>
           </a:p>
         </p:txBody>
@@ -29495,7 +29266,7 @@
         <p:spPr>
           <a:xfrm>
             <a:off x="3724502" y="3562444"/>
-            <a:ext cx="546411" cy="410370"/>
+            <a:ext cx="812167" cy="410370"/>
           </a:xfrm>
           <a:prstGeom prst="rect">
             <a:avLst/>
@@ -29536,7 +29307,7 @@
             </a:pPr>
             <a:r>
               <a:rPr lang="de-DE" dirty="0"/>
-              <a:t>L</a:t>
+              <a:t>0x4C</a:t>
             </a:r>
           </a:p>
         </p:txBody>
@@ -29556,7 +29327,7 @@
         <p:spPr>
           <a:xfrm>
             <a:off x="3724502" y="4462572"/>
-            <a:ext cx="546411" cy="410370"/>
+            <a:ext cx="786145" cy="410370"/>
           </a:xfrm>
           <a:prstGeom prst="rect">
             <a:avLst/>
@@ -29597,7 +29368,7 @@
             </a:pPr>
             <a:r>
               <a:rPr lang="de-DE" dirty="0"/>
-              <a:t>L</a:t>
+              <a:t>0x4C</a:t>
             </a:r>
           </a:p>
         </p:txBody>
@@ -29617,7 +29388,7 @@
         <p:spPr>
           <a:xfrm>
             <a:off x="3724502" y="5357400"/>
-            <a:ext cx="546411" cy="410370"/>
+            <a:ext cx="786145" cy="410370"/>
           </a:xfrm>
           <a:prstGeom prst="rect">
             <a:avLst/>
@@ -29663,7 +29434,7 @@
             </a:pPr>
             <a:r>
               <a:rPr lang="de-DE" dirty="0"/>
-              <a:t>O</a:t>
+              <a:t>0x4F</a:t>
             </a:r>
           </a:p>
         </p:txBody>
@@ -29686,7 +29457,7 @@
         <p:spPr>
           <a:xfrm flipH="1">
             <a:off x="3297041" y="2172558"/>
-            <a:ext cx="373568" cy="489758"/>
+            <a:ext cx="453485" cy="489758"/>
           </a:xfrm>
           <a:prstGeom prst="straightConnector1">
             <a:avLst/>
@@ -29731,7 +29502,7 @@
         <p:spPr>
           <a:xfrm flipH="1">
             <a:off x="2501583" y="3072686"/>
-            <a:ext cx="522253" cy="489758"/>
+            <a:ext cx="451631" cy="489758"/>
           </a:xfrm>
           <a:prstGeom prst="straightConnector1">
             <a:avLst/>
@@ -29775,9 +29546,9 @@
           <p:nvPr/>
         </p:nvCxnSpPr>
         <p:spPr>
-          <a:xfrm>
-            <a:off x="2774789" y="3972814"/>
-            <a:ext cx="0" cy="489758"/>
+          <a:xfrm flipH="1">
+            <a:off x="2704168" y="3972814"/>
+            <a:ext cx="141243" cy="489758"/>
           </a:xfrm>
           <a:prstGeom prst="straightConnector1">
             <a:avLst/>
@@ -29822,8 +29593,8 @@
         </p:nvCxnSpPr>
         <p:spPr>
           <a:xfrm>
-            <a:off x="3603700" y="3072686"/>
-            <a:ext cx="394008" cy="489758"/>
+            <a:off x="3674322" y="3072686"/>
+            <a:ext cx="456264" cy="489758"/>
           </a:xfrm>
           <a:prstGeom prst="straightConnector1">
             <a:avLst/>
@@ -29867,9 +29638,9 @@
           <p:nvPr/>
         </p:nvCxnSpPr>
         <p:spPr>
-          <a:xfrm>
-            <a:off x="3997708" y="3972814"/>
-            <a:ext cx="0" cy="489758"/>
+          <a:xfrm flipH="1">
+            <a:off x="4117575" y="3972814"/>
+            <a:ext cx="13011" cy="489758"/>
           </a:xfrm>
           <a:prstGeom prst="straightConnector1">
             <a:avLst/>
@@ -29914,7 +29685,7 @@
         </p:nvCxnSpPr>
         <p:spPr>
           <a:xfrm>
-            <a:off x="3997708" y="4872942"/>
+            <a:off x="4117575" y="4872942"/>
             <a:ext cx="0" cy="484458"/>
           </a:xfrm>
           <a:prstGeom prst="straightConnector1">
@@ -29959,7 +29730,7 @@
         <p:spPr>
           <a:xfrm>
             <a:off x="1219171" y="1762188"/>
-            <a:ext cx="1791669" cy="4699572"/>
+            <a:ext cx="873545" cy="4699572"/>
           </a:xfrm>
           <a:prstGeom prst="rect">
             <a:avLst/>
@@ -30296,15 +30067,7 @@
           <a:p>
             <a:r>
               <a:rPr lang="de-DE" dirty="0"/>
-              <a:t>Max. </a:t>
-            </a:r>
-            <a:r>
-              <a:rPr lang="de-DE" dirty="0" err="1"/>
-              <a:t>size</a:t>
-            </a:r>
-            <a:r>
-              <a:rPr lang="de-DE" dirty="0"/>
-              <a:t> </a:t>
+              <a:t>Size </a:t>
             </a:r>
             <a:r>
               <a:rPr lang="de-DE" dirty="0" err="1"/>
@@ -31136,124 +30899,12 @@
           </a:p>
         </p:txBody>
       </p:sp>
-    </p:spTree>
-    <p:extLst>
-      <p:ext uri="{BB962C8B-B14F-4D97-AF65-F5344CB8AC3E}">
-        <p14:creationId xmlns:p14="http://schemas.microsoft.com/office/powerpoint/2010/main" val="571032661"/>
-      </p:ext>
-    </p:extLst>
-  </p:cSld>
-  <p:clrMapOvr>
-    <a:masterClrMapping/>
-  </p:clrMapOvr>
-</p:sld>
-</file>
-
-<file path=ppt/slides/slide8.xml><?xml version="1.0" encoding="utf-8"?>
-<p:sld xmlns:a="http://schemas.openxmlformats.org/drawingml/2006/main" xmlns:r="http://schemas.openxmlformats.org/officeDocument/2006/relationships" xmlns:p="http://schemas.openxmlformats.org/presentationml/2006/main">
-  <p:cSld>
-    <p:spTree>
-      <p:nvGrpSpPr>
-        <p:cNvPr id="1" name=""/>
-        <p:cNvGrpSpPr/>
-        <p:nvPr/>
-      </p:nvGrpSpPr>
-      <p:grpSpPr>
-        <a:xfrm>
-          <a:off x="0" y="0"/>
-          <a:ext cx="0" cy="0"/>
-          <a:chOff x="0" y="0"/>
-          <a:chExt cx="0" cy="0"/>
-        </a:xfrm>
-      </p:grpSpPr>
-      <p:sp>
-        <p:nvSpPr>
-          <p:cNvPr id="4" name="Foliennummernplatzhalter 3"/>
-          <p:cNvSpPr>
-            <a:spLocks noGrp="1"/>
-          </p:cNvSpPr>
-          <p:nvPr>
-            <p:ph type="sldNum" sz="quarter" idx="11"/>
-          </p:nvPr>
-        </p:nvSpPr>
-        <p:spPr>
-          <a:prstGeom prst="rect">
-            <a:avLst/>
-          </a:prstGeom>
-        </p:spPr>
-        <p:txBody>
-          <a:bodyPr/>
-          <a:lstStyle/>
-          <a:p>
-            <a:fld id="{CE58CB1E-F828-4F11-99E0-327109AF9DA4}" type="slidenum">
-              <a:rPr lang="de-DE" smtClean="0"/>
-              <a:pPr/>
-              <a:t>8</a:t>
-            </a:fld>
-            <a:endParaRPr lang="de-DE" dirty="0"/>
-          </a:p>
-        </p:txBody>
-      </p:sp>
-      <p:sp>
-        <p:nvSpPr>
-          <p:cNvPr id="6" name="Fußzeilenplatzhalter 4"/>
-          <p:cNvSpPr>
-            <a:spLocks noGrp="1"/>
-          </p:cNvSpPr>
-          <p:nvPr>
-            <p:ph type="ftr" sz="quarter" idx="12"/>
-          </p:nvPr>
-        </p:nvSpPr>
-        <p:spPr/>
-        <p:txBody>
-          <a:bodyPr/>
-          <a:lstStyle/>
-          <a:p>
-            <a:r>
-              <a:rPr lang="de-DE" dirty="0"/>
-              <a:t>Jonas Fritsch | The Adaptive Radix Tree</a:t>
-            </a:r>
-            <a:endParaRPr lang="en-US" dirty="0"/>
-          </a:p>
-        </p:txBody>
-      </p:sp>
-      <p:sp>
-        <p:nvSpPr>
-          <p:cNvPr id="3" name="Titel 2"/>
-          <p:cNvSpPr>
-            <a:spLocks noGrp="1"/>
-          </p:cNvSpPr>
-          <p:nvPr>
-            <p:ph type="title"/>
-          </p:nvPr>
-        </p:nvSpPr>
-        <p:spPr>
-          <a:prstGeom prst="rect">
-            <a:avLst/>
-          </a:prstGeom>
-        </p:spPr>
-        <p:txBody>
-          <a:bodyPr/>
-          <a:lstStyle/>
-          <a:p>
-            <a:r>
-              <a:rPr sz="3000" dirty="0"/>
-              <a:t>Radix </a:t>
-            </a:r>
-            <a:r>
-              <a:rPr sz="3000" dirty="0" err="1"/>
-              <a:t>Trees</a:t>
-            </a:r>
-            <a:endParaRPr lang="de-DE" sz="3000" dirty="0"/>
-          </a:p>
-        </p:txBody>
-      </p:sp>
-      <p:sp>
-        <p:nvSpPr>
-          <p:cNvPr id="5" name="Rectangle 4">
+      <p:sp>
+        <p:nvSpPr>
+          <p:cNvPr id="13" name="Rectangle 12">
             <a:extLst>
               <a:ext uri="{FF2B5EF4-FFF2-40B4-BE49-F238E27FC236}">
-                <a16:creationId xmlns:a16="http://schemas.microsoft.com/office/drawing/2014/main" id="{A1C74294-BEB8-251A-AC8C-10D4D211BE63}"/>
+                <a16:creationId xmlns:a16="http://schemas.microsoft.com/office/drawing/2014/main" id="{025C98D6-65AA-B386-E435-E5EEE2A094F9}"/>
               </a:ext>
             </a:extLst>
           </p:cNvPr>
@@ -31262,7 +30913,7 @@
         </p:nvSpPr>
         <p:spPr>
           <a:xfrm>
-            <a:off x="3397403" y="1762188"/>
+            <a:off x="6742767" y="1762188"/>
             <a:ext cx="546411" cy="410370"/>
           </a:xfrm>
           <a:prstGeom prst="rect">
@@ -31311,10 +30962,10 @@
       </p:sp>
       <p:sp>
         <p:nvSpPr>
-          <p:cNvPr id="7" name="Rectangle 6">
+          <p:cNvPr id="14" name="Rectangle 13">
             <a:extLst>
               <a:ext uri="{FF2B5EF4-FFF2-40B4-BE49-F238E27FC236}">
-                <a16:creationId xmlns:a16="http://schemas.microsoft.com/office/drawing/2014/main" id="{6B3AF17C-1D1E-4D03-69E6-7E26292656A4}"/>
+                <a16:creationId xmlns:a16="http://schemas.microsoft.com/office/drawing/2014/main" id="{4F3D41EF-9320-EAE0-3EB6-8FC8DA88C20F}"/>
               </a:ext>
             </a:extLst>
           </p:cNvPr>
@@ -31323,7 +30974,7 @@
         </p:nvSpPr>
         <p:spPr>
           <a:xfrm>
-            <a:off x="3090745" y="2673869"/>
+            <a:off x="6436109" y="2673869"/>
             <a:ext cx="546411" cy="410370"/>
           </a:xfrm>
           <a:prstGeom prst="rect">
@@ -31372,10 +31023,10 @@
       </p:sp>
       <p:sp>
         <p:nvSpPr>
-          <p:cNvPr id="8" name="Rectangle 7">
+          <p:cNvPr id="15" name="Rectangle 14">
             <a:extLst>
               <a:ext uri="{FF2B5EF4-FFF2-40B4-BE49-F238E27FC236}">
-                <a16:creationId xmlns:a16="http://schemas.microsoft.com/office/drawing/2014/main" id="{0A99FB4C-349B-9C93-2DD7-0BD0612FDB50}"/>
+                <a16:creationId xmlns:a16="http://schemas.microsoft.com/office/drawing/2014/main" id="{20F7F293-675D-7041-D9D2-A2F3D43D46E3}"/>
               </a:ext>
             </a:extLst>
           </p:cNvPr>
@@ -31384,7 +31035,7 @@
         </p:nvSpPr>
         <p:spPr>
           <a:xfrm>
-            <a:off x="3681760" y="2673869"/>
+            <a:off x="7027124" y="2673869"/>
             <a:ext cx="546411" cy="410370"/>
           </a:xfrm>
           <a:prstGeom prst="rect">
@@ -31433,10 +31084,10 @@
       </p:sp>
       <p:sp>
         <p:nvSpPr>
-          <p:cNvPr id="9" name="Rectangle 8">
+          <p:cNvPr id="17" name="Rectangle 16">
             <a:extLst>
               <a:ext uri="{FF2B5EF4-FFF2-40B4-BE49-F238E27FC236}">
-                <a16:creationId xmlns:a16="http://schemas.microsoft.com/office/drawing/2014/main" id="{0C1F2F21-95C1-4E47-0055-58A875A13733}"/>
+                <a16:creationId xmlns:a16="http://schemas.microsoft.com/office/drawing/2014/main" id="{72AF415D-821E-5BB8-26B8-9F52293C9711}"/>
               </a:ext>
             </a:extLst>
           </p:cNvPr>
@@ -31445,7 +31096,7 @@
         </p:nvSpPr>
         <p:spPr>
           <a:xfrm>
-            <a:off x="2817539" y="3635356"/>
+            <a:off x="6162903" y="3635356"/>
             <a:ext cx="546411" cy="410370"/>
           </a:xfrm>
           <a:prstGeom prst="rect">
@@ -31497,10 +31148,10 @@
       </p:sp>
       <p:sp>
         <p:nvSpPr>
-          <p:cNvPr id="10" name="Rectangle 9">
+          <p:cNvPr id="19" name="Rectangle 18">
             <a:extLst>
               <a:ext uri="{FF2B5EF4-FFF2-40B4-BE49-F238E27FC236}">
-                <a16:creationId xmlns:a16="http://schemas.microsoft.com/office/drawing/2014/main" id="{FCA6C8AC-A1B9-BC8A-FCB2-644A667A0199}"/>
+                <a16:creationId xmlns:a16="http://schemas.microsoft.com/office/drawing/2014/main" id="{B3684ECB-9964-5F56-3CA7-6E45E2533492}"/>
               </a:ext>
             </a:extLst>
           </p:cNvPr>
@@ -31509,7 +31160,7 @@
         </p:nvSpPr>
         <p:spPr>
           <a:xfrm>
-            <a:off x="3408554" y="3635356"/>
+            <a:off x="6753918" y="3635356"/>
             <a:ext cx="546411" cy="410370"/>
           </a:xfrm>
           <a:prstGeom prst="rect">
@@ -31558,22 +31209,22 @@
       </p:sp>
       <p:cxnSp>
         <p:nvCxnSpPr>
-          <p:cNvPr id="16" name="Straight Arrow Connector 15">
+          <p:cNvPr id="20" name="Straight Arrow Connector 19">
             <a:extLst>
               <a:ext uri="{FF2B5EF4-FFF2-40B4-BE49-F238E27FC236}">
-                <a16:creationId xmlns:a16="http://schemas.microsoft.com/office/drawing/2014/main" id="{C6A23FB2-2A37-C5A8-1C59-72C88E53A598}"/>
+                <a16:creationId xmlns:a16="http://schemas.microsoft.com/office/drawing/2014/main" id="{5591BA15-E587-79F9-39F1-4B6DEBF3FDA1}"/>
               </a:ext>
             </a:extLst>
           </p:cNvPr>
           <p:cNvCxnSpPr>
             <a:cxnSpLocks/>
-            <a:stCxn id="5" idx="2"/>
+            <a:stCxn id="13" idx="2"/>
           </p:cNvCxnSpPr>
           <p:nvPr/>
         </p:nvCxnSpPr>
         <p:spPr>
           <a:xfrm flipH="1">
-            <a:off x="3637156" y="2172558"/>
+            <a:off x="6982520" y="2172558"/>
             <a:ext cx="33453" cy="501311"/>
           </a:xfrm>
           <a:prstGeom prst="straightConnector1">
@@ -31603,22 +31254,22 @@
       </p:cxnSp>
       <p:cxnSp>
         <p:nvCxnSpPr>
-          <p:cNvPr id="18" name="Straight Arrow Connector 17">
+          <p:cNvPr id="21" name="Straight Arrow Connector 20">
             <a:extLst>
               <a:ext uri="{FF2B5EF4-FFF2-40B4-BE49-F238E27FC236}">
-                <a16:creationId xmlns:a16="http://schemas.microsoft.com/office/drawing/2014/main" id="{196E2A1C-94C5-6837-7224-DB98C668D3D2}"/>
+                <a16:creationId xmlns:a16="http://schemas.microsoft.com/office/drawing/2014/main" id="{2785E1DC-02FC-03A6-2473-5536A4B7C9C7}"/>
               </a:ext>
             </a:extLst>
           </p:cNvPr>
           <p:cNvCxnSpPr>
             <a:cxnSpLocks/>
-            <a:stCxn id="7" idx="2"/>
+            <a:stCxn id="14" idx="2"/>
           </p:cNvCxnSpPr>
           <p:nvPr/>
         </p:nvCxnSpPr>
         <p:spPr>
           <a:xfrm>
-            <a:off x="3363951" y="3084239"/>
+            <a:off x="6709315" y="3084239"/>
             <a:ext cx="0" cy="551117"/>
           </a:xfrm>
           <a:prstGeom prst="straightConnector1">
@@ -31646,344 +31297,25 @@
           </a:fontRef>
         </p:style>
       </p:cxnSp>
-      <p:sp>
-        <p:nvSpPr>
-          <p:cNvPr id="34" name="Inhaltsplatzhalter 1">
+      <p:cxnSp>
+        <p:nvCxnSpPr>
+          <p:cNvPr id="22" name="Straight Arrow Connector 21">
             <a:extLst>
               <a:ext uri="{FF2B5EF4-FFF2-40B4-BE49-F238E27FC236}">
-                <a16:creationId xmlns:a16="http://schemas.microsoft.com/office/drawing/2014/main" id="{AFBD4F7E-D557-E99E-4FC8-07EF8ED2E628}"/>
-              </a:ext>
-            </a:extLst>
-          </p:cNvPr>
-          <p:cNvSpPr txBox="1">
-            <a:spLocks/>
-          </p:cNvSpPr>
-          <p:nvPr/>
-        </p:nvSpPr>
-        <p:spPr>
-          <a:xfrm>
-            <a:off x="1219171" y="1762188"/>
-            <a:ext cx="999918" cy="4699572"/>
-          </a:xfrm>
-          <a:prstGeom prst="rect">
-            <a:avLst/>
-          </a:prstGeom>
-          <a:noFill/>
-          <a:ln w="9525">
-            <a:noFill/>
-            <a:miter lim="800000"/>
-            <a:headEnd/>
-            <a:tailEnd/>
-          </a:ln>
-        </p:spPr>
-        <p:txBody>
-          <a:bodyPr vert="horz" wrap="square" lIns="0" tIns="0" rIns="0" bIns="0" numCol="1" anchor="t" anchorCtr="0" compatLnSpc="1">
-            <a:prstTxWarp prst="textNoShape">
-              <a:avLst/>
-            </a:prstTxWarp>
-          </a:bodyPr>
-          <a:lstStyle>
-            <a:lvl1pPr algn="l" rtl="0" eaLnBrk="1" fontAlgn="base" hangingPunct="1">
-              <a:lnSpc>
-                <a:spcPct val="114000"/>
-              </a:lnSpc>
-              <a:spcBef>
-                <a:spcPct val="0"/>
-              </a:spcBef>
-              <a:spcAft>
-                <a:spcPct val="0"/>
-              </a:spcAft>
-              <a:defRPr lang="de-DE" sz="1600" kern="1200" noProof="0" dirty="0" smtClean="0">
-                <a:solidFill>
-                  <a:schemeClr val="tx1"/>
-                </a:solidFill>
-                <a:latin typeface="+mn-lt"/>
-                <a:ea typeface="+mn-ea"/>
-                <a:cs typeface="+mn-cs"/>
-              </a:defRPr>
-            </a:lvl1pPr>
-            <a:lvl2pPr marL="176213" indent="-176213" algn="l" rtl="0" eaLnBrk="1" fontAlgn="base" hangingPunct="1">
-              <a:lnSpc>
-                <a:spcPct val="114000"/>
-              </a:lnSpc>
-              <a:spcBef>
-                <a:spcPct val="0"/>
-              </a:spcBef>
-              <a:spcAft>
-                <a:spcPct val="0"/>
-              </a:spcAft>
-              <a:buFont typeface="Arial" charset="0"/>
-              <a:buChar char="•"/>
-              <a:defRPr lang="de-DE" sz="1600" kern="1200" noProof="0" dirty="0" smtClean="0">
-                <a:solidFill>
-                  <a:schemeClr val="tx1"/>
-                </a:solidFill>
-                <a:latin typeface="+mn-lt"/>
-                <a:ea typeface="+mn-ea"/>
-                <a:cs typeface="+mn-cs"/>
-              </a:defRPr>
-            </a:lvl2pPr>
-            <a:lvl3pPr marL="360363" indent="-184150" algn="l" rtl="0" eaLnBrk="1" fontAlgn="base" hangingPunct="1">
-              <a:lnSpc>
-                <a:spcPct val="125000"/>
-              </a:lnSpc>
-              <a:spcBef>
-                <a:spcPct val="0"/>
-              </a:spcBef>
-              <a:spcAft>
-                <a:spcPct val="0"/>
-              </a:spcAft>
-              <a:buFont typeface="Symbol" pitchFamily="18" charset="2"/>
-              <a:buChar char="-"/>
-              <a:defRPr sz="1600" kern="1200">
-                <a:solidFill>
-                  <a:schemeClr val="tx1"/>
-                </a:solidFill>
-                <a:latin typeface="+mn-lt"/>
-                <a:ea typeface="+mn-ea"/>
-                <a:cs typeface="+mn-cs"/>
-              </a:defRPr>
-            </a:lvl3pPr>
-            <a:lvl4pPr marL="538163" indent="-177800" algn="l" rtl="0" eaLnBrk="1" fontAlgn="base" hangingPunct="1">
-              <a:lnSpc>
-                <a:spcPct val="125000"/>
-              </a:lnSpc>
-              <a:spcBef>
-                <a:spcPct val="0"/>
-              </a:spcBef>
-              <a:spcAft>
-                <a:spcPct val="0"/>
-              </a:spcAft>
-              <a:buFont typeface="Symbol" pitchFamily="18" charset="2"/>
-              <a:buChar char="-"/>
-              <a:defRPr sz="1400" kern="1200">
-                <a:solidFill>
-                  <a:schemeClr val="tx1"/>
-                </a:solidFill>
-                <a:latin typeface="+mn-lt"/>
-                <a:ea typeface="+mn-ea"/>
-                <a:cs typeface="+mn-cs"/>
-              </a:defRPr>
-            </a:lvl4pPr>
-            <a:lvl5pPr marL="714375" indent="-176213" algn="l" rtl="0" eaLnBrk="1" fontAlgn="base" hangingPunct="1">
-              <a:lnSpc>
-                <a:spcPct val="125000"/>
-              </a:lnSpc>
-              <a:spcBef>
-                <a:spcPct val="0"/>
-              </a:spcBef>
-              <a:spcAft>
-                <a:spcPct val="0"/>
-              </a:spcAft>
-              <a:buFont typeface="Symbol" pitchFamily="18" charset="2"/>
-              <a:buChar char="-"/>
-              <a:defRPr sz="1400" kern="1200">
-                <a:solidFill>
-                  <a:schemeClr val="tx1"/>
-                </a:solidFill>
-                <a:latin typeface="+mn-lt"/>
-                <a:ea typeface="+mn-ea"/>
-                <a:cs typeface="+mn-cs"/>
-              </a:defRPr>
-            </a:lvl5pPr>
-            <a:lvl6pPr marL="2514600" indent="-228600" algn="l" defTabSz="914400" rtl="0" eaLnBrk="1" latinLnBrk="0" hangingPunct="1">
-              <a:spcBef>
-                <a:spcPct val="20000"/>
-              </a:spcBef>
-              <a:buFont typeface="Arial" pitchFamily="34" charset="0"/>
-              <a:buChar char="•"/>
-              <a:defRPr sz="2000" kern="1200">
-                <a:solidFill>
-                  <a:schemeClr val="tx1"/>
-                </a:solidFill>
-                <a:latin typeface="+mn-lt"/>
-                <a:ea typeface="+mn-ea"/>
-                <a:cs typeface="+mn-cs"/>
-              </a:defRPr>
-            </a:lvl6pPr>
-            <a:lvl7pPr marL="2971800" indent="-228600" algn="l" defTabSz="914400" rtl="0" eaLnBrk="1" latinLnBrk="0" hangingPunct="1">
-              <a:spcBef>
-                <a:spcPct val="20000"/>
-              </a:spcBef>
-              <a:buFont typeface="Arial" pitchFamily="34" charset="0"/>
-              <a:buChar char="•"/>
-              <a:defRPr sz="2000" kern="1200">
-                <a:solidFill>
-                  <a:schemeClr val="tx1"/>
-                </a:solidFill>
-                <a:latin typeface="+mn-lt"/>
-                <a:ea typeface="+mn-ea"/>
-                <a:cs typeface="+mn-cs"/>
-              </a:defRPr>
-            </a:lvl7pPr>
-            <a:lvl8pPr marL="3429000" indent="-228600" algn="l" defTabSz="914400" rtl="0" eaLnBrk="1" latinLnBrk="0" hangingPunct="1">
-              <a:spcBef>
-                <a:spcPct val="20000"/>
-              </a:spcBef>
-              <a:buFont typeface="Arial" pitchFamily="34" charset="0"/>
-              <a:buChar char="•"/>
-              <a:defRPr sz="2000" kern="1200">
-                <a:solidFill>
-                  <a:schemeClr val="tx1"/>
-                </a:solidFill>
-                <a:latin typeface="+mn-lt"/>
-                <a:ea typeface="+mn-ea"/>
-                <a:cs typeface="+mn-cs"/>
-              </a:defRPr>
-            </a:lvl8pPr>
-            <a:lvl9pPr marL="3886200" indent="-228600" algn="l" defTabSz="914400" rtl="0" eaLnBrk="1" latinLnBrk="0" hangingPunct="1">
-              <a:spcBef>
-                <a:spcPct val="20000"/>
-              </a:spcBef>
-              <a:buFont typeface="Arial" pitchFamily="34" charset="0"/>
-              <a:buChar char="•"/>
-              <a:defRPr sz="2000" kern="1200">
-                <a:solidFill>
-                  <a:schemeClr val="tx1"/>
-                </a:solidFill>
-                <a:latin typeface="+mn-lt"/>
-                <a:ea typeface="+mn-ea"/>
-                <a:cs typeface="+mn-cs"/>
-              </a:defRPr>
-            </a:lvl9pPr>
-          </a:lstStyle>
-          <a:p>
-            <a:r>
-              <a:rPr lang="de-DE" b="1" dirty="0"/>
-              <a:t>Keys:</a:t>
-            </a:r>
-          </a:p>
-          <a:p>
-            <a:r>
-              <a:rPr lang="de-DE" dirty="0"/>
-              <a:t>HELLO,</a:t>
-            </a:r>
-          </a:p>
-          <a:p>
-            <a:r>
-              <a:rPr lang="de-DE" dirty="0"/>
-              <a:t>HAT,</a:t>
-            </a:r>
-          </a:p>
-          <a:p>
-            <a:r>
-              <a:rPr lang="de-DE" dirty="0"/>
-              <a:t>HAVE</a:t>
-            </a:r>
-          </a:p>
-        </p:txBody>
-      </p:sp>
-      <p:cxnSp>
-        <p:nvCxnSpPr>
-          <p:cNvPr id="11" name="Straight Arrow Connector 10">
-            <a:extLst>
-              <a:ext uri="{FF2B5EF4-FFF2-40B4-BE49-F238E27FC236}">
-                <a16:creationId xmlns:a16="http://schemas.microsoft.com/office/drawing/2014/main" id="{D72231FC-03DE-6AC8-94B8-F07E21DA33B4}"/>
+                <a16:creationId xmlns:a16="http://schemas.microsoft.com/office/drawing/2014/main" id="{3DAE3904-121C-E59A-2CAB-4214C20151A7}"/>
               </a:ext>
             </a:extLst>
           </p:cNvPr>
           <p:cNvCxnSpPr>
             <a:cxnSpLocks/>
-            <a:stCxn id="8" idx="2"/>
+            <a:stCxn id="15" idx="2"/>
           </p:cNvCxnSpPr>
           <p:nvPr/>
         </p:nvCxnSpPr>
         <p:spPr>
           <a:xfrm>
-            <a:off x="3954966" y="3084239"/>
+            <a:off x="7300330" y="3084239"/>
             <a:ext cx="317809" cy="410369"/>
-          </a:xfrm>
-          <a:prstGeom prst="straightConnector1">
-            <a:avLst/>
-          </a:prstGeom>
-          <a:ln w="63500">
-            <a:solidFill>
-              <a:schemeClr val="accent5"/>
-            </a:solidFill>
-            <a:prstDash val="sysDot"/>
-            <a:tailEnd type="triangle"/>
-          </a:ln>
-        </p:spPr>
-        <p:style>
-          <a:lnRef idx="1">
-            <a:schemeClr val="accent1"/>
-          </a:lnRef>
-          <a:fillRef idx="0">
-            <a:schemeClr val="accent1"/>
-          </a:fillRef>
-          <a:effectRef idx="0">
-            <a:schemeClr val="accent1"/>
-          </a:effectRef>
-          <a:fontRef idx="minor">
-            <a:schemeClr val="tx1"/>
-          </a:fontRef>
-        </p:style>
-      </p:cxnSp>
-      <p:cxnSp>
-        <p:nvCxnSpPr>
-          <p:cNvPr id="17" name="Straight Arrow Connector 16">
-            <a:extLst>
-              <a:ext uri="{FF2B5EF4-FFF2-40B4-BE49-F238E27FC236}">
-                <a16:creationId xmlns:a16="http://schemas.microsoft.com/office/drawing/2014/main" id="{E4955D9C-CF91-DCAD-F38A-F7183715D9A4}"/>
-              </a:ext>
-            </a:extLst>
-          </p:cNvPr>
-          <p:cNvCxnSpPr>
-            <a:cxnSpLocks/>
-            <a:stCxn id="9" idx="2"/>
-          </p:cNvCxnSpPr>
-          <p:nvPr/>
-        </p:nvCxnSpPr>
-        <p:spPr>
-          <a:xfrm>
-            <a:off x="3090745" y="4045726"/>
-            <a:ext cx="0" cy="634583"/>
-          </a:xfrm>
-          <a:prstGeom prst="straightConnector1">
-            <a:avLst/>
-          </a:prstGeom>
-          <a:ln w="63500">
-            <a:solidFill>
-              <a:schemeClr val="accent5"/>
-            </a:solidFill>
-            <a:prstDash val="sysDot"/>
-            <a:tailEnd type="triangle"/>
-          </a:ln>
-        </p:spPr>
-        <p:style>
-          <a:lnRef idx="1">
-            <a:schemeClr val="accent1"/>
-          </a:lnRef>
-          <a:fillRef idx="0">
-            <a:schemeClr val="accent1"/>
-          </a:fillRef>
-          <a:effectRef idx="0">
-            <a:schemeClr val="accent1"/>
-          </a:effectRef>
-          <a:fontRef idx="minor">
-            <a:schemeClr val="tx1"/>
-          </a:fontRef>
-        </p:style>
-      </p:cxnSp>
-      <p:cxnSp>
-        <p:nvCxnSpPr>
-          <p:cNvPr id="20" name="Straight Arrow Connector 19">
-            <a:extLst>
-              <a:ext uri="{FF2B5EF4-FFF2-40B4-BE49-F238E27FC236}">
-                <a16:creationId xmlns:a16="http://schemas.microsoft.com/office/drawing/2014/main" id="{F11B7D10-425E-6008-EFDB-DC8695E8D765}"/>
-              </a:ext>
-            </a:extLst>
-          </p:cNvPr>
-          <p:cNvCxnSpPr>
-            <a:cxnSpLocks/>
-            <a:stCxn id="10" idx="2"/>
-          </p:cNvCxnSpPr>
-          <p:nvPr/>
-        </p:nvCxnSpPr>
-        <p:spPr>
-          <a:xfrm>
-            <a:off x="3681760" y="4045726"/>
-            <a:ext cx="0" cy="634583"/>
           </a:xfrm>
           <a:prstGeom prst="straightConnector1">
             <a:avLst/>
@@ -32016,7 +31348,99 @@
           <p:cNvPr id="23" name="Straight Arrow Connector 22">
             <a:extLst>
               <a:ext uri="{FF2B5EF4-FFF2-40B4-BE49-F238E27FC236}">
-                <a16:creationId xmlns:a16="http://schemas.microsoft.com/office/drawing/2014/main" id="{E1822E45-D274-C59B-35FC-ABC2C04DAAB3}"/>
+                <a16:creationId xmlns:a16="http://schemas.microsoft.com/office/drawing/2014/main" id="{CFC7313C-F311-46D0-A54A-446DFAC4AE0D}"/>
+              </a:ext>
+            </a:extLst>
+          </p:cNvPr>
+          <p:cNvCxnSpPr>
+            <a:cxnSpLocks/>
+            <a:stCxn id="17" idx="2"/>
+          </p:cNvCxnSpPr>
+          <p:nvPr/>
+        </p:nvCxnSpPr>
+        <p:spPr>
+          <a:xfrm>
+            <a:off x="6436109" y="4045726"/>
+            <a:ext cx="0" cy="634583"/>
+          </a:xfrm>
+          <a:prstGeom prst="straightConnector1">
+            <a:avLst/>
+          </a:prstGeom>
+          <a:ln w="63500">
+            <a:solidFill>
+              <a:schemeClr val="accent5"/>
+            </a:solidFill>
+            <a:prstDash val="sysDot"/>
+            <a:tailEnd type="triangle"/>
+          </a:ln>
+        </p:spPr>
+        <p:style>
+          <a:lnRef idx="1">
+            <a:schemeClr val="accent1"/>
+          </a:lnRef>
+          <a:fillRef idx="0">
+            <a:schemeClr val="accent1"/>
+          </a:fillRef>
+          <a:effectRef idx="0">
+            <a:schemeClr val="accent1"/>
+          </a:effectRef>
+          <a:fontRef idx="minor">
+            <a:schemeClr val="tx1"/>
+          </a:fontRef>
+        </p:style>
+      </p:cxnSp>
+      <p:cxnSp>
+        <p:nvCxnSpPr>
+          <p:cNvPr id="24" name="Straight Arrow Connector 23">
+            <a:extLst>
+              <a:ext uri="{FF2B5EF4-FFF2-40B4-BE49-F238E27FC236}">
+                <a16:creationId xmlns:a16="http://schemas.microsoft.com/office/drawing/2014/main" id="{E880C056-1F9F-0EDD-5E2A-CAC8C2B23F82}"/>
+              </a:ext>
+            </a:extLst>
+          </p:cNvPr>
+          <p:cNvCxnSpPr>
+            <a:cxnSpLocks/>
+            <a:stCxn id="19" idx="2"/>
+          </p:cNvCxnSpPr>
+          <p:nvPr/>
+        </p:nvCxnSpPr>
+        <p:spPr>
+          <a:xfrm>
+            <a:off x="7027124" y="4045726"/>
+            <a:ext cx="0" cy="634583"/>
+          </a:xfrm>
+          <a:prstGeom prst="straightConnector1">
+            <a:avLst/>
+          </a:prstGeom>
+          <a:ln w="63500">
+            <a:solidFill>
+              <a:schemeClr val="accent5"/>
+            </a:solidFill>
+            <a:prstDash val="sysDot"/>
+            <a:tailEnd type="triangle"/>
+          </a:ln>
+        </p:spPr>
+        <p:style>
+          <a:lnRef idx="1">
+            <a:schemeClr val="accent1"/>
+          </a:lnRef>
+          <a:fillRef idx="0">
+            <a:schemeClr val="accent1"/>
+          </a:fillRef>
+          <a:effectRef idx="0">
+            <a:schemeClr val="accent1"/>
+          </a:effectRef>
+          <a:fontRef idx="minor">
+            <a:schemeClr val="tx1"/>
+          </a:fontRef>
+        </p:style>
+      </p:cxnSp>
+      <p:cxnSp>
+        <p:nvCxnSpPr>
+          <p:cNvPr id="25" name="Straight Arrow Connector 24">
+            <a:extLst>
+              <a:ext uri="{FF2B5EF4-FFF2-40B4-BE49-F238E27FC236}">
+                <a16:creationId xmlns:a16="http://schemas.microsoft.com/office/drawing/2014/main" id="{E3A1393F-B774-7309-8D7F-99FEAD0866B0}"/>
               </a:ext>
             </a:extLst>
           </p:cNvPr>
@@ -32027,7 +31451,7 @@
         </p:nvCxnSpPr>
         <p:spPr>
           <a:xfrm>
-            <a:off x="6030950" y="3933554"/>
+            <a:off x="7027124" y="5508524"/>
             <a:ext cx="648630" cy="0"/>
           </a:xfrm>
           <a:prstGeom prst="straightConnector1">
@@ -32058,10 +31482,10 @@
       </p:cxnSp>
       <p:sp>
         <p:nvSpPr>
-          <p:cNvPr id="24" name="TextBox 23">
+          <p:cNvPr id="26" name="TextBox 25">
             <a:extLst>
               <a:ext uri="{FF2B5EF4-FFF2-40B4-BE49-F238E27FC236}">
-                <a16:creationId xmlns:a16="http://schemas.microsoft.com/office/drawing/2014/main" id="{2C91AAA6-0212-820D-3836-69DF7124055D}"/>
+                <a16:creationId xmlns:a16="http://schemas.microsoft.com/office/drawing/2014/main" id="{D2482D64-E624-2346-83A2-36CF6E69E51D}"/>
               </a:ext>
             </a:extLst>
           </p:cNvPr>
@@ -32070,7 +31494,7 @@
         </p:nvSpPr>
         <p:spPr>
           <a:xfrm>
-            <a:off x="6774934" y="3704692"/>
+            <a:off x="6306575" y="5278803"/>
             <a:ext cx="914398" cy="537968"/>
           </a:xfrm>
           <a:prstGeom prst="rect">
@@ -32104,10 +31528,405 @@
           </a:p>
         </p:txBody>
       </p:sp>
+      <p:sp>
+        <p:nvSpPr>
+          <p:cNvPr id="27" name="TextBox 26">
+            <a:extLst>
+              <a:ext uri="{FF2B5EF4-FFF2-40B4-BE49-F238E27FC236}">
+                <a16:creationId xmlns:a16="http://schemas.microsoft.com/office/drawing/2014/main" id="{5F921368-54C4-FEEB-3C33-F7C20E3418A8}"/>
+              </a:ext>
+            </a:extLst>
+          </p:cNvPr>
+          <p:cNvSpPr txBox="1"/>
+          <p:nvPr/>
+        </p:nvSpPr>
+        <p:spPr>
+          <a:xfrm>
+            <a:off x="5264303" y="2718272"/>
+            <a:ext cx="395871" cy="321563"/>
+          </a:xfrm>
+          <a:prstGeom prst="rect">
+            <a:avLst/>
+          </a:prstGeom>
+          <a:noFill/>
+        </p:spPr>
+        <p:txBody>
+          <a:bodyPr wrap="square" lIns="0" tIns="0" rIns="0" bIns="0" rtlCol="0">
+            <a:spAutoFit/>
+          </a:bodyPr>
+          <a:lstStyle/>
+          <a:p>
+            <a:pPr>
+              <a:lnSpc>
+                <a:spcPct val="114000"/>
+              </a:lnSpc>
+            </a:pPr>
+            <a:r>
+              <a:rPr lang="de-DE" sz="2000" b="1" dirty="0">
+                <a:latin typeface="+mn-lt"/>
+              </a:rPr>
+              <a:t>OR</a:t>
+            </a:r>
+          </a:p>
+        </p:txBody>
+      </p:sp>
     </p:spTree>
     <p:extLst>
       <p:ext uri="{BB962C8B-B14F-4D97-AF65-F5344CB8AC3E}">
-        <p14:creationId xmlns:p14="http://schemas.microsoft.com/office/powerpoint/2010/main" val="3159392113"/>
+        <p14:creationId xmlns:p14="http://schemas.microsoft.com/office/powerpoint/2010/main" val="571032661"/>
+      </p:ext>
+    </p:extLst>
+  </p:cSld>
+  <p:clrMapOvr>
+    <a:masterClrMapping/>
+  </p:clrMapOvr>
+</p:sld>
+</file>
+
+<file path=ppt/slides/slide8.xml><?xml version="1.0" encoding="utf-8"?>
+<p:sld xmlns:a="http://schemas.openxmlformats.org/drawingml/2006/main" xmlns:r="http://schemas.openxmlformats.org/officeDocument/2006/relationships" xmlns:p="http://schemas.openxmlformats.org/presentationml/2006/main">
+  <p:cSld>
+    <p:spTree>
+      <p:nvGrpSpPr>
+        <p:cNvPr id="1" name=""/>
+        <p:cNvGrpSpPr/>
+        <p:nvPr/>
+      </p:nvGrpSpPr>
+      <p:grpSpPr>
+        <a:xfrm>
+          <a:off x="0" y="0"/>
+          <a:ext cx="0" cy="0"/>
+          <a:chOff x="0" y="0"/>
+          <a:chExt cx="0" cy="0"/>
+        </a:xfrm>
+      </p:grpSpPr>
+      <p:sp>
+        <p:nvSpPr>
+          <p:cNvPr id="2" name="Inhaltsplatzhalter 1"/>
+          <p:cNvSpPr>
+            <a:spLocks noGrp="1"/>
+          </p:cNvSpPr>
+          <p:nvPr>
+            <p:ph idx="1"/>
+          </p:nvPr>
+        </p:nvSpPr>
+        <p:spPr/>
+        <p:txBody>
+          <a:bodyPr/>
+          <a:lstStyle/>
+          <a:p>
+            <a:r>
+              <a:rPr dirty="0"/>
+              <a:t>Kurze und knappe Texte, Fließtexte linksbündig, kein Blocksatz</a:t>
+            </a:r>
+          </a:p>
+          <a:p>
+            <a:endParaRPr dirty="0"/>
+          </a:p>
+          <a:p>
+            <a:r>
+              <a:rPr dirty="0"/>
+              <a:t>Beispiel:</a:t>
+            </a:r>
+          </a:p>
+          <a:p>
+            <a:r>
+              <a:rPr dirty="0" err="1"/>
+              <a:t>Tem</a:t>
+            </a:r>
+            <a:r>
+              <a:rPr dirty="0"/>
+              <a:t> </a:t>
+            </a:r>
+            <a:r>
+              <a:rPr dirty="0" err="1"/>
+              <a:t>soluptam</a:t>
+            </a:r>
+            <a:r>
+              <a:rPr dirty="0"/>
+              <a:t>, nisi </a:t>
+            </a:r>
+            <a:r>
+              <a:rPr dirty="0" err="1"/>
+              <a:t>as</a:t>
+            </a:r>
+            <a:r>
+              <a:rPr dirty="0"/>
+              <a:t> </a:t>
+            </a:r>
+            <a:r>
+              <a:rPr dirty="0" err="1"/>
+              <a:t>verum</a:t>
+            </a:r>
+            <a:r>
+              <a:rPr dirty="0"/>
+              <a:t> </a:t>
+            </a:r>
+            <a:r>
+              <a:rPr dirty="0" err="1"/>
+              <a:t>ereprehendam</a:t>
+            </a:r>
+            <a:r>
+              <a:rPr dirty="0"/>
+              <a:t> at </a:t>
+            </a:r>
+            <a:r>
+              <a:rPr dirty="0" err="1"/>
+              <a:t>acculpa</a:t>
+            </a:r>
+            <a:r>
+              <a:rPr dirty="0"/>
+              <a:t> </a:t>
+            </a:r>
+            <a:r>
+              <a:rPr dirty="0" err="1"/>
+              <a:t>quidisq</a:t>
+            </a:r>
+            <a:r>
+              <a:rPr dirty="0"/>
+              <a:t> </a:t>
+            </a:r>
+            <a:r>
+              <a:rPr dirty="0" err="1"/>
+              <a:t>uissit</a:t>
+            </a:r>
+            <a:r>
+              <a:rPr dirty="0"/>
+              <a:t> </a:t>
+            </a:r>
+            <a:r>
+              <a:rPr dirty="0" err="1"/>
+              <a:t>volupta</a:t>
+            </a:r>
+            <a:r>
+              <a:rPr dirty="0"/>
+              <a:t> </a:t>
+            </a:r>
+            <a:r>
+              <a:rPr dirty="0" err="1"/>
+              <a:t>tusdant</a:t>
+            </a:r>
+            <a:r>
+              <a:rPr dirty="0"/>
+              <a:t> </a:t>
+            </a:r>
+            <a:r>
+              <a:rPr dirty="0" err="1"/>
+              <a:t>utem</a:t>
+            </a:r>
+            <a:r>
+              <a:rPr dirty="0"/>
+              <a:t> </a:t>
+            </a:r>
+            <a:r>
+              <a:rPr dirty="0" err="1"/>
+              <a:t>as</a:t>
+            </a:r>
+            <a:r>
+              <a:rPr dirty="0"/>
+              <a:t> </a:t>
+            </a:r>
+            <a:r>
+              <a:rPr dirty="0" err="1"/>
+              <a:t>etur</a:t>
+            </a:r>
+            <a:r>
+              <a:rPr dirty="0"/>
+              <a:t>, </a:t>
+            </a:r>
+            <a:r>
+              <a:rPr dirty="0" err="1"/>
+              <a:t>odi</a:t>
+            </a:r>
+            <a:r>
+              <a:rPr dirty="0"/>
+              <a:t> </a:t>
+            </a:r>
+            <a:r>
+              <a:rPr dirty="0" err="1"/>
+              <a:t>odis</a:t>
+            </a:r>
+            <a:r>
+              <a:rPr dirty="0"/>
+              <a:t> es </a:t>
+            </a:r>
+            <a:r>
+              <a:rPr dirty="0" err="1"/>
+              <a:t>doluptiae</a:t>
+            </a:r>
+            <a:r>
+              <a:rPr dirty="0"/>
+              <a:t> dem </a:t>
+            </a:r>
+            <a:r>
+              <a:rPr dirty="0" err="1"/>
+              <a:t>nimaion</a:t>
+            </a:r>
+            <a:r>
+              <a:rPr dirty="0"/>
+              <a:t> </a:t>
+            </a:r>
+            <a:r>
+              <a:rPr dirty="0" err="1"/>
+              <a:t>con</a:t>
+            </a:r>
+            <a:r>
+              <a:rPr dirty="0"/>
+              <a:t> </a:t>
+            </a:r>
+            <a:r>
+              <a:rPr dirty="0" err="1"/>
+              <a:t>nossinctenis</a:t>
+            </a:r>
+            <a:r>
+              <a:rPr dirty="0"/>
+              <a:t> </a:t>
+            </a:r>
+            <a:r>
+              <a:rPr dirty="0" err="1"/>
+              <a:t>pora</a:t>
+            </a:r>
+            <a:r>
+              <a:rPr dirty="0"/>
+              <a:t> quam </a:t>
+            </a:r>
+            <a:r>
+              <a:rPr dirty="0" err="1"/>
+              <a:t>voloria</a:t>
+            </a:r>
+            <a:r>
+              <a:rPr dirty="0"/>
+              <a:t> </a:t>
+            </a:r>
+            <a:r>
+              <a:rPr dirty="0" err="1"/>
+              <a:t>consenimus</a:t>
+            </a:r>
+            <a:r>
+              <a:rPr dirty="0"/>
+              <a:t> </a:t>
+            </a:r>
+            <a:r>
+              <a:rPr dirty="0" err="1"/>
+              <a:t>blabore</a:t>
+            </a:r>
+            <a:r>
+              <a:rPr dirty="0"/>
+              <a:t> </a:t>
+            </a:r>
+            <a:r>
+              <a:rPr dirty="0" err="1"/>
+              <a:t>everfer</a:t>
+            </a:r>
+            <a:r>
+              <a:rPr dirty="0"/>
+              <a:t> </a:t>
+            </a:r>
+            <a:r>
+              <a:rPr dirty="0" err="1"/>
+              <a:t>epeliquo</a:t>
+            </a:r>
+            <a:r>
+              <a:rPr dirty="0"/>
+              <a:t> </a:t>
+            </a:r>
+            <a:r>
+              <a:rPr dirty="0" err="1"/>
+              <a:t>maio</a:t>
+            </a:r>
+            <a:r>
+              <a:rPr dirty="0"/>
+              <a:t> </a:t>
+            </a:r>
+            <a:r>
+              <a:rPr dirty="0" err="1"/>
+              <a:t>etur</a:t>
+            </a:r>
+            <a:r>
+              <a:rPr dirty="0"/>
+              <a:t>.</a:t>
+            </a:r>
+          </a:p>
+        </p:txBody>
+      </p:sp>
+      <p:sp>
+        <p:nvSpPr>
+          <p:cNvPr id="4" name="Foliennummernplatzhalter 3"/>
+          <p:cNvSpPr>
+            <a:spLocks noGrp="1"/>
+          </p:cNvSpPr>
+          <p:nvPr>
+            <p:ph type="sldNum" sz="quarter" idx="11"/>
+          </p:nvPr>
+        </p:nvSpPr>
+        <p:spPr/>
+        <p:txBody>
+          <a:bodyPr/>
+          <a:lstStyle/>
+          <a:p>
+            <a:fld id="{CE58CB1E-F828-4F11-99E0-327109AF9DA4}" type="slidenum">
+              <a:rPr lang="de-DE" smtClean="0"/>
+              <a:pPr/>
+              <a:t>8</a:t>
+            </a:fld>
+            <a:endParaRPr lang="de-DE" dirty="0"/>
+          </a:p>
+        </p:txBody>
+      </p:sp>
+      <p:sp>
+        <p:nvSpPr>
+          <p:cNvPr id="6" name="Fußzeilenplatzhalter 4"/>
+          <p:cNvSpPr>
+            <a:spLocks noGrp="1"/>
+          </p:cNvSpPr>
+          <p:nvPr>
+            <p:ph type="ftr" sz="quarter" idx="12"/>
+          </p:nvPr>
+        </p:nvSpPr>
+        <p:spPr/>
+        <p:txBody>
+          <a:bodyPr/>
+          <a:lstStyle/>
+          <a:p>
+            <a:r>
+              <a:rPr lang="de-DE"/>
+              <a:t>Dr. rer. nat. Erika Mustermann (TUM) | kann beliebig erweitert werden | Infos mit Strich trennen</a:t>
+            </a:r>
+            <a:endParaRPr lang="en-US" dirty="0"/>
+          </a:p>
+        </p:txBody>
+      </p:sp>
+      <p:sp>
+        <p:nvSpPr>
+          <p:cNvPr id="3" name="Titel 2"/>
+          <p:cNvSpPr>
+            <a:spLocks noGrp="1"/>
+          </p:cNvSpPr>
+          <p:nvPr>
+            <p:ph type="title"/>
+          </p:nvPr>
+        </p:nvSpPr>
+        <p:spPr>
+          <a:prstGeom prst="rect">
+            <a:avLst/>
+          </a:prstGeom>
+        </p:spPr>
+        <p:txBody>
+          <a:bodyPr/>
+          <a:lstStyle/>
+          <a:p>
+            <a:r>
+              <a:rPr dirty="0"/>
+              <a:t>Adaptive Nodes</a:t>
+            </a:r>
+            <a:endParaRPr lang="de-DE" dirty="0"/>
+          </a:p>
+        </p:txBody>
+      </p:sp>
+    </p:spTree>
+    <p:extLst>
+      <p:ext uri="{BB962C8B-B14F-4D97-AF65-F5344CB8AC3E}">
+        <p14:creationId xmlns:p14="http://schemas.microsoft.com/office/powerpoint/2010/main" val="3045694777"/>
       </p:ext>
     </p:extLst>
   </p:cSld>

</xml_diff>